<commit_message>
shadow volume prez 2
</commit_message>
<xml_diff>
--- a/GFX_EA_01.pptx
+++ b/GFX_EA_01.pptx
@@ -5,16 +5,19 @@
     <p:sldMasterId id="2147483767" r:id="rId1"/>
   </p:sldMasterIdLst>
   <p:notesMasterIdLst>
-    <p:notesMasterId r:id="rId9"/>
+    <p:notesMasterId r:id="rId12"/>
   </p:notesMasterIdLst>
   <p:sldIdLst>
     <p:sldId id="256" r:id="rId2"/>
     <p:sldId id="257" r:id="rId3"/>
     <p:sldId id="258" r:id="rId4"/>
     <p:sldId id="259" r:id="rId5"/>
-    <p:sldId id="260" r:id="rId6"/>
-    <p:sldId id="261" r:id="rId7"/>
+    <p:sldId id="261" r:id="rId6"/>
+    <p:sldId id="260" r:id="rId7"/>
     <p:sldId id="262" r:id="rId8"/>
+    <p:sldId id="264" r:id="rId9"/>
+    <p:sldId id="265" r:id="rId10"/>
+    <p:sldId id="263" r:id="rId11"/>
   </p:sldIdLst>
   <p:sldSz cx="12192000" cy="6858000"/>
   <p:notesSz cx="7104063" cy="10234613"/>
@@ -207,7 +210,7 @@
           <a:p>
             <a:fld id="{3A5A56FF-9D9E-417E-8DB7-17CB8EBF566C}" type="datetimeFigureOut">
               <a:rPr lang="hu-HU" smtClean="0"/>
-              <a:t>2018. 04. 18.</a:t>
+              <a:t>2018. 04. 20.</a:t>
             </a:fld>
             <a:endParaRPr lang="hu-HU"/>
           </a:p>
@@ -475,6 +478,130 @@
 </p:notesMaster>
 </file>
 
+<file path=ppt/notesSlides/notesSlide1.xml><?xml version="1.0" encoding="utf-8"?>
+<p:notes xmlns:a="http://schemas.openxmlformats.org/drawingml/2006/main" xmlns:r="http://schemas.openxmlformats.org/officeDocument/2006/relationships" xmlns:p="http://schemas.openxmlformats.org/presentationml/2006/main">
+  <p:cSld>
+    <p:spTree>
+      <p:nvGrpSpPr>
+        <p:cNvPr id="1" name=""/>
+        <p:cNvGrpSpPr/>
+        <p:nvPr/>
+      </p:nvGrpSpPr>
+      <p:grpSpPr>
+        <a:xfrm>
+          <a:off x="0" y="0"/>
+          <a:ext cx="0" cy="0"/>
+          <a:chOff x="0" y="0"/>
+          <a:chExt cx="0" cy="0"/>
+        </a:xfrm>
+      </p:grpSpPr>
+      <p:sp>
+        <p:nvSpPr>
+          <p:cNvPr id="2" name="Slide Image Placeholder 1"/>
+          <p:cNvSpPr>
+            <a:spLocks noGrp="1" noRot="1" noChangeAspect="1"/>
+          </p:cNvSpPr>
+          <p:nvPr>
+            <p:ph type="sldImg"/>
+          </p:nvPr>
+        </p:nvSpPr>
+        <p:spPr/>
+      </p:sp>
+      <p:sp>
+        <p:nvSpPr>
+          <p:cNvPr id="3" name="Notes Placeholder 2"/>
+          <p:cNvSpPr>
+            <a:spLocks noGrp="1"/>
+          </p:cNvSpPr>
+          <p:nvPr>
+            <p:ph type="body" idx="1"/>
+          </p:nvPr>
+        </p:nvSpPr>
+        <p:spPr/>
+        <p:txBody>
+          <a:bodyPr/>
+          <a:lstStyle/>
+          <a:p>
+            <a:r>
+              <a:rPr lang="en-US" dirty="0"/>
+              <a:t>* </a:t>
+            </a:r>
+            <a:r>
+              <a:rPr lang="en-US" dirty="0" err="1"/>
+              <a:t>Bizonyos</a:t>
+            </a:r>
+            <a:r>
+              <a:rPr lang="en-US" dirty="0"/>
+              <a:t> </a:t>
+            </a:r>
+            <a:r>
+              <a:rPr lang="en-US" dirty="0" err="1"/>
+              <a:t>algoritmusok</a:t>
+            </a:r>
+            <a:r>
+              <a:rPr lang="en-US" dirty="0"/>
+              <a:t> a </a:t>
+            </a:r>
+            <a:r>
+              <a:rPr lang="en-US" dirty="0" err="1"/>
+              <a:t>teljes</a:t>
+            </a:r>
+            <a:r>
+              <a:rPr lang="en-US" dirty="0"/>
+              <a:t> </a:t>
+            </a:r>
+            <a:r>
+              <a:rPr lang="en-US" dirty="0" err="1"/>
+              <a:t>jelenetet</a:t>
+            </a:r>
+            <a:r>
+              <a:rPr lang="en-US" dirty="0"/>
+              <a:t> </a:t>
+            </a:r>
+            <a:r>
+              <a:rPr lang="en-US" dirty="0" err="1"/>
+              <a:t>igénylik</a:t>
+            </a:r>
+            <a:endParaRPr lang="hu-HU" dirty="0"/>
+          </a:p>
+        </p:txBody>
+      </p:sp>
+      <p:sp>
+        <p:nvSpPr>
+          <p:cNvPr id="4" name="Slide Number Placeholder 3"/>
+          <p:cNvSpPr>
+            <a:spLocks noGrp="1"/>
+          </p:cNvSpPr>
+          <p:nvPr>
+            <p:ph type="sldNum" sz="quarter" idx="10"/>
+          </p:nvPr>
+        </p:nvSpPr>
+        <p:spPr/>
+        <p:txBody>
+          <a:bodyPr/>
+          <a:lstStyle/>
+          <a:p>
+            <a:fld id="{14C09B99-3F57-4C83-A41A-980FBCAF7828}" type="slidenum">
+              <a:rPr lang="hu-HU" smtClean="0"/>
+              <a:t>2</a:t>
+            </a:fld>
+            <a:endParaRPr lang="hu-HU"/>
+          </a:p>
+        </p:txBody>
+      </p:sp>
+    </p:spTree>
+    <p:extLst>
+      <p:ext uri="{BB962C8B-B14F-4D97-AF65-F5344CB8AC3E}">
+        <p14:creationId xmlns:p14="http://schemas.microsoft.com/office/powerpoint/2010/main" val="4184641614"/>
+      </p:ext>
+    </p:extLst>
+  </p:cSld>
+  <p:clrMapOvr>
+    <a:masterClrMapping/>
+  </p:clrMapOvr>
+</p:notes>
+</file>
+
 <file path=ppt/slideLayouts/slideLayout1.xml><?xml version="1.0" encoding="utf-8"?>
 <p:sldLayout xmlns:a="http://schemas.openxmlformats.org/drawingml/2006/main" xmlns:r="http://schemas.openxmlformats.org/officeDocument/2006/relationships" xmlns:p="http://schemas.openxmlformats.org/presentationml/2006/main" showMasterSp="0" type="title" preserve="1">
   <p:cSld name="Title Slide">
@@ -701,7 +828,7 @@
           <a:p>
             <a:fld id="{EE90FBA0-FEE2-473A-A4B4-051DFD2DB1BD}" type="datetimeFigureOut">
               <a:rPr lang="en-US" smtClean="0"/>
-              <a:t>4/18/2018</a:t>
+              <a:t>4/20/2018</a:t>
             </a:fld>
             <a:endParaRPr lang="en-US"/>
           </a:p>
@@ -909,7 +1036,7 @@
           <a:p>
             <a:fld id="{EE90FBA0-FEE2-473A-A4B4-051DFD2DB1BD}" type="datetimeFigureOut">
               <a:rPr lang="en-US" smtClean="0"/>
-              <a:t>4/18/2018</a:t>
+              <a:t>4/20/2018</a:t>
             </a:fld>
             <a:endParaRPr lang="en-US"/>
           </a:p>
@@ -1165,7 +1292,7 @@
           <a:p>
             <a:fld id="{EE90FBA0-FEE2-473A-A4B4-051DFD2DB1BD}" type="datetimeFigureOut">
               <a:rPr lang="en-US" smtClean="0"/>
-              <a:t>4/18/2018</a:t>
+              <a:t>4/20/2018</a:t>
             </a:fld>
             <a:endParaRPr lang="en-US"/>
           </a:p>
@@ -1339,7 +1466,7 @@
           <a:p>
             <a:fld id="{EE90FBA0-FEE2-473A-A4B4-051DFD2DB1BD}" type="datetimeFigureOut">
               <a:rPr lang="en-US" smtClean="0"/>
-              <a:t>4/18/2018</a:t>
+              <a:t>4/20/2018</a:t>
             </a:fld>
             <a:endParaRPr lang="en-US"/>
           </a:p>
@@ -1682,7 +1809,7 @@
           <a:p>
             <a:fld id="{EE90FBA0-FEE2-473A-A4B4-051DFD2DB1BD}" type="datetimeFigureOut">
               <a:rPr lang="en-US" smtClean="0"/>
-              <a:t>4/18/2018</a:t>
+              <a:t>4/20/2018</a:t>
             </a:fld>
             <a:endParaRPr lang="en-US"/>
           </a:p>
@@ -1957,7 +2084,7 @@
           <a:p>
             <a:fld id="{EE90FBA0-FEE2-473A-A4B4-051DFD2DB1BD}" type="datetimeFigureOut">
               <a:rPr lang="en-US" smtClean="0"/>
-              <a:t>4/18/2018</a:t>
+              <a:t>4/20/2018</a:t>
             </a:fld>
             <a:endParaRPr lang="en-US"/>
           </a:p>
@@ -2336,7 +2463,7 @@
           <a:p>
             <a:fld id="{EE90FBA0-FEE2-473A-A4B4-051DFD2DB1BD}" type="datetimeFigureOut">
               <a:rPr lang="en-US" smtClean="0"/>
-              <a:t>4/18/2018</a:t>
+              <a:t>4/20/2018</a:t>
             </a:fld>
             <a:endParaRPr lang="en-US"/>
           </a:p>
@@ -2454,7 +2581,7 @@
           <a:p>
             <a:fld id="{EE90FBA0-FEE2-473A-A4B4-051DFD2DB1BD}" type="datetimeFigureOut">
               <a:rPr lang="en-US" smtClean="0"/>
-              <a:t>4/18/2018</a:t>
+              <a:t>4/20/2018</a:t>
             </a:fld>
             <a:endParaRPr lang="en-US"/>
           </a:p>
@@ -2625,7 +2752,7 @@
           <a:p>
             <a:fld id="{EE90FBA0-FEE2-473A-A4B4-051DFD2DB1BD}" type="datetimeFigureOut">
               <a:rPr lang="en-US" smtClean="0"/>
-              <a:t>4/18/2018</a:t>
+              <a:t>4/20/2018</a:t>
             </a:fld>
             <a:endParaRPr lang="en-US"/>
           </a:p>
@@ -2979,7 +3106,7 @@
           <a:p>
             <a:fld id="{EE90FBA0-FEE2-473A-A4B4-051DFD2DB1BD}" type="datetimeFigureOut">
               <a:rPr lang="en-US" smtClean="0"/>
-              <a:t>4/18/2018</a:t>
+              <a:t>4/20/2018</a:t>
             </a:fld>
             <a:endParaRPr lang="en-US"/>
           </a:p>
@@ -3361,7 +3488,7 @@
           <a:p>
             <a:fld id="{EE90FBA0-FEE2-473A-A4B4-051DFD2DB1BD}" type="datetimeFigureOut">
               <a:rPr lang="en-US" smtClean="0"/>
-              <a:t>4/18/2018</a:t>
+              <a:t>4/20/2018</a:t>
             </a:fld>
             <a:endParaRPr lang="en-US"/>
           </a:p>
@@ -3648,7 +3775,7 @@
           <a:p>
             <a:fld id="{EE90FBA0-FEE2-473A-A4B4-051DFD2DB1BD}" type="datetimeFigureOut">
               <a:rPr lang="en-US" smtClean="0"/>
-              <a:t>4/18/2018</a:t>
+              <a:t>4/20/2018</a:t>
             </a:fld>
             <a:endParaRPr lang="en-US"/>
           </a:p>
@@ -4279,6 +4406,445 @@
 </p:sld>
 </file>
 
+<file path=ppt/slides/slide10.xml><?xml version="1.0" encoding="utf-8"?>
+<p:sld xmlns:a="http://schemas.openxmlformats.org/drawingml/2006/main" xmlns:r="http://schemas.openxmlformats.org/officeDocument/2006/relationships" xmlns:p="http://schemas.openxmlformats.org/presentationml/2006/main">
+  <p:cSld>
+    <p:bg>
+      <p:bgPr>
+        <a:solidFill>
+          <a:schemeClr val="bg1"/>
+        </a:solidFill>
+        <a:effectLst/>
+      </p:bgPr>
+    </p:bg>
+    <p:spTree>
+      <p:nvGrpSpPr>
+        <p:cNvPr id="1" name=""/>
+        <p:cNvGrpSpPr/>
+        <p:nvPr/>
+      </p:nvGrpSpPr>
+      <p:grpSpPr>
+        <a:xfrm>
+          <a:off x="0" y="0"/>
+          <a:ext cx="0" cy="0"/>
+          <a:chOff x="0" y="0"/>
+          <a:chExt cx="0" cy="0"/>
+        </a:xfrm>
+      </p:grpSpPr>
+      <p:sp>
+        <p:nvSpPr>
+          <p:cNvPr id="11" name="Rectangle 10">
+            <a:extLst>
+              <a:ext uri="{FF2B5EF4-FFF2-40B4-BE49-F238E27FC236}">
+                <a16:creationId xmlns:a16="http://schemas.microsoft.com/office/drawing/2014/main" id="{25C8D2C1-DA83-420D-9635-D52CE066B5DA}"/>
+              </a:ext>
+            </a:extLst>
+          </p:cNvPr>
+          <p:cNvSpPr>
+            <a:spLocks noGrp="1" noRot="1" noChangeAspect="1" noMove="1" noResize="1" noEditPoints="1" noAdjustHandles="1" noChangeArrowheads="1" noChangeShapeType="1" noTextEdit="1"/>
+          </p:cNvSpPr>
+          <p:nvPr>
+            <p:extLst>
+              <p:ext uri="{386F3935-93C4-4BCD-93E2-E3B085C9AB24}">
+                <p16:designElem xmlns:p16="http://schemas.microsoft.com/office/powerpoint/2015/main" val="1"/>
+              </p:ext>
+            </p:extLst>
+          </p:nvPr>
+        </p:nvSpPr>
+        <p:spPr>
+          <a:xfrm>
+            <a:off x="3175" y="6400800"/>
+            <a:ext cx="12188825" cy="457200"/>
+          </a:xfrm>
+          <a:prstGeom prst="rect">
+            <a:avLst/>
+          </a:prstGeom>
+          <a:solidFill>
+            <a:schemeClr val="accent2"/>
+          </a:solidFill>
+          <a:ln>
+            <a:noFill/>
+          </a:ln>
+        </p:spPr>
+        <p:style>
+          <a:lnRef idx="2">
+            <a:schemeClr val="accent1">
+              <a:shade val="50000"/>
+            </a:schemeClr>
+          </a:lnRef>
+          <a:fillRef idx="1">
+            <a:schemeClr val="accent1"/>
+          </a:fillRef>
+          <a:effectRef idx="0">
+            <a:schemeClr val="accent1"/>
+          </a:effectRef>
+          <a:fontRef idx="minor">
+            <a:schemeClr val="lt1"/>
+          </a:fontRef>
+        </p:style>
+      </p:sp>
+      <p:sp>
+        <p:nvSpPr>
+          <p:cNvPr id="13" name="Rectangle 12">
+            <a:extLst>
+              <a:ext uri="{FF2B5EF4-FFF2-40B4-BE49-F238E27FC236}">
+                <a16:creationId xmlns:a16="http://schemas.microsoft.com/office/drawing/2014/main" id="{434F74C9-6A0B-409E-AD1C-45B58BE91BB8}"/>
+              </a:ext>
+            </a:extLst>
+          </p:cNvPr>
+          <p:cNvSpPr>
+            <a:spLocks noGrp="1" noRot="1" noChangeAspect="1" noMove="1" noResize="1" noEditPoints="1" noAdjustHandles="1" noChangeArrowheads="1" noChangeShapeType="1" noTextEdit="1"/>
+          </p:cNvSpPr>
+          <p:nvPr>
+            <p:extLst>
+              <p:ext uri="{386F3935-93C4-4BCD-93E2-E3B085C9AB24}">
+                <p16:designElem xmlns:p16="http://schemas.microsoft.com/office/powerpoint/2015/main" val="1"/>
+              </p:ext>
+            </p:extLst>
+          </p:nvPr>
+        </p:nvSpPr>
+        <p:spPr>
+          <a:xfrm>
+            <a:off x="15" y="6334316"/>
+            <a:ext cx="12188825" cy="64008"/>
+          </a:xfrm>
+          <a:prstGeom prst="rect">
+            <a:avLst/>
+          </a:prstGeom>
+          <a:solidFill>
+            <a:schemeClr val="accent1"/>
+          </a:solidFill>
+          <a:ln>
+            <a:noFill/>
+          </a:ln>
+        </p:spPr>
+        <p:style>
+          <a:lnRef idx="2">
+            <a:schemeClr val="accent1">
+              <a:shade val="50000"/>
+            </a:schemeClr>
+          </a:lnRef>
+          <a:fillRef idx="1">
+            <a:schemeClr val="accent1"/>
+          </a:fillRef>
+          <a:effectRef idx="0">
+            <a:schemeClr val="accent1"/>
+          </a:effectRef>
+          <a:fontRef idx="minor">
+            <a:schemeClr val="lt1"/>
+          </a:fontRef>
+        </p:style>
+      </p:sp>
+      <p:cxnSp>
+        <p:nvCxnSpPr>
+          <p:cNvPr id="15" name="Straight Connector 14">
+            <a:extLst>
+              <a:ext uri="{FF2B5EF4-FFF2-40B4-BE49-F238E27FC236}">
+                <a16:creationId xmlns:a16="http://schemas.microsoft.com/office/drawing/2014/main" id="{F5486A9D-1265-4B57-91E6-68E666B978BC}"/>
+              </a:ext>
+            </a:extLst>
+          </p:cNvPr>
+          <p:cNvCxnSpPr>
+            <a:cxnSpLocks noGrp="1" noRot="1" noChangeAspect="1" noMove="1" noResize="1" noEditPoints="1" noAdjustHandles="1" noChangeArrowheads="1" noChangeShapeType="1"/>
+          </p:cNvCxnSpPr>
+          <p:nvPr>
+            <p:extLst>
+              <p:ext uri="{386F3935-93C4-4BCD-93E2-E3B085C9AB24}">
+                <p16:designElem xmlns:p16="http://schemas.microsoft.com/office/powerpoint/2015/main" val="1"/>
+              </p:ext>
+            </p:extLst>
+          </p:nvPr>
+        </p:nvCxnSpPr>
+        <p:spPr>
+          <a:xfrm>
+            <a:off x="1207658" y="4343400"/>
+            <a:ext cx="9875520" cy="0"/>
+          </a:xfrm>
+          <a:prstGeom prst="line">
+            <a:avLst/>
+          </a:prstGeom>
+          <a:ln w="6350">
+            <a:solidFill>
+              <a:schemeClr val="tx1">
+                <a:lumMod val="50000"/>
+                <a:lumOff val="50000"/>
+              </a:schemeClr>
+            </a:solidFill>
+          </a:ln>
+        </p:spPr>
+        <p:style>
+          <a:lnRef idx="1">
+            <a:schemeClr val="accent1"/>
+          </a:lnRef>
+          <a:fillRef idx="0">
+            <a:schemeClr val="accent1"/>
+          </a:fillRef>
+          <a:effectRef idx="0">
+            <a:schemeClr val="accent1"/>
+          </a:effectRef>
+          <a:fontRef idx="minor">
+            <a:schemeClr val="tx1"/>
+          </a:fontRef>
+        </p:style>
+      </p:cxnSp>
+      <p:pic>
+        <p:nvPicPr>
+          <p:cNvPr id="6" name="Content Placeholder 5">
+            <a:extLst>
+              <a:ext uri="{FF2B5EF4-FFF2-40B4-BE49-F238E27FC236}">
+                <a16:creationId xmlns:a16="http://schemas.microsoft.com/office/drawing/2014/main" id="{72B267E6-5E7F-4D72-A7F3-97627CA8BCFE}"/>
+              </a:ext>
+            </a:extLst>
+          </p:cNvPr>
+          <p:cNvPicPr>
+            <a:picLocks noGrp="1" noChangeAspect="1"/>
+          </p:cNvPicPr>
+          <p:nvPr>
+            <p:ph idx="1"/>
+          </p:nvPr>
+        </p:nvPicPr>
+        <p:blipFill rotWithShape="1">
+          <a:blip r:embed="rId2">
+            <a:extLst>
+              <a:ext uri="{28A0092B-C50C-407E-A947-70E740481C1C}">
+                <a14:useLocalDpi xmlns:a14="http://schemas.microsoft.com/office/drawing/2010/main" val="0"/>
+              </a:ext>
+            </a:extLst>
+          </a:blip>
+          <a:srcRect t="12006" b="16642"/>
+          <a:stretch/>
+        </p:blipFill>
+        <p:spPr>
+          <a:xfrm>
+            <a:off x="-32" y="10"/>
+            <a:ext cx="12192031" cy="4915066"/>
+          </a:xfrm>
+          <a:prstGeom prst="rect">
+            <a:avLst/>
+          </a:prstGeom>
+        </p:spPr>
+      </p:pic>
+      <p:sp>
+        <p:nvSpPr>
+          <p:cNvPr id="17" name="Rectangle 16">
+            <a:extLst>
+              <a:ext uri="{FF2B5EF4-FFF2-40B4-BE49-F238E27FC236}">
+                <a16:creationId xmlns:a16="http://schemas.microsoft.com/office/drawing/2014/main" id="{B76D919A-FC3E-4B4E-BAF0-ED6CFB8DC4AE}"/>
+              </a:ext>
+            </a:extLst>
+          </p:cNvPr>
+          <p:cNvSpPr>
+            <a:spLocks noGrp="1" noRot="1" noChangeAspect="1" noMove="1" noResize="1" noEditPoints="1" noAdjustHandles="1" noChangeArrowheads="1" noChangeShapeType="1" noTextEdit="1"/>
+          </p:cNvSpPr>
+          <p:nvPr>
+            <p:extLst>
+              <p:ext uri="{386F3935-93C4-4BCD-93E2-E3B085C9AB24}">
+                <p16:designElem xmlns:p16="http://schemas.microsoft.com/office/powerpoint/2015/main" val="1"/>
+              </p:ext>
+            </p:extLst>
+          </p:nvPr>
+        </p:nvSpPr>
+        <p:spPr bwMode="white">
+          <a:xfrm>
+            <a:off x="1507" y="4953000"/>
+            <a:ext cx="12188952" cy="1905000"/>
+          </a:xfrm>
+          <a:prstGeom prst="rect">
+            <a:avLst/>
+          </a:prstGeom>
+          <a:solidFill>
+            <a:schemeClr val="accent2"/>
+          </a:solidFill>
+          <a:ln>
+            <a:noFill/>
+          </a:ln>
+        </p:spPr>
+        <p:style>
+          <a:lnRef idx="2">
+            <a:schemeClr val="accent1">
+              <a:shade val="50000"/>
+            </a:schemeClr>
+          </a:lnRef>
+          <a:fillRef idx="1">
+            <a:schemeClr val="accent1"/>
+          </a:fillRef>
+          <a:effectRef idx="0">
+            <a:schemeClr val="accent1"/>
+          </a:effectRef>
+          <a:fontRef idx="minor">
+            <a:schemeClr val="lt1"/>
+          </a:fontRef>
+        </p:style>
+      </p:sp>
+      <p:sp>
+        <p:nvSpPr>
+          <p:cNvPr id="19" name="Rectangle 18">
+            <a:extLst>
+              <a:ext uri="{FF2B5EF4-FFF2-40B4-BE49-F238E27FC236}">
+                <a16:creationId xmlns:a16="http://schemas.microsoft.com/office/drawing/2014/main" id="{8F66ACBD-1C82-4782-AA7C-05504DD7DE77}"/>
+              </a:ext>
+            </a:extLst>
+          </p:cNvPr>
+          <p:cNvSpPr>
+            <a:spLocks noGrp="1" noRot="1" noChangeAspect="1" noMove="1" noResize="1" noEditPoints="1" noAdjustHandles="1" noChangeArrowheads="1" noChangeShapeType="1" noTextEdit="1"/>
+          </p:cNvSpPr>
+          <p:nvPr>
+            <p:extLst>
+              <p:ext uri="{386F3935-93C4-4BCD-93E2-E3B085C9AB24}">
+                <p16:designElem xmlns:p16="http://schemas.microsoft.com/office/powerpoint/2015/main" val="1"/>
+              </p:ext>
+            </p:extLst>
+          </p:nvPr>
+        </p:nvSpPr>
+        <p:spPr>
+          <a:xfrm>
+            <a:off x="1507" y="4906176"/>
+            <a:ext cx="12188952" cy="64008"/>
+          </a:xfrm>
+          <a:prstGeom prst="rect">
+            <a:avLst/>
+          </a:prstGeom>
+          <a:solidFill>
+            <a:schemeClr val="accent1"/>
+          </a:solidFill>
+          <a:ln>
+            <a:noFill/>
+          </a:ln>
+        </p:spPr>
+        <p:style>
+          <a:lnRef idx="2">
+            <a:schemeClr val="accent1">
+              <a:shade val="50000"/>
+            </a:schemeClr>
+          </a:lnRef>
+          <a:fillRef idx="1">
+            <a:schemeClr val="accent1"/>
+          </a:fillRef>
+          <a:effectRef idx="0">
+            <a:schemeClr val="accent1"/>
+          </a:effectRef>
+          <a:fontRef idx="minor">
+            <a:schemeClr val="lt1"/>
+          </a:fontRef>
+        </p:style>
+      </p:sp>
+      <p:sp>
+        <p:nvSpPr>
+          <p:cNvPr id="2" name="Title 1">
+            <a:extLst>
+              <a:ext uri="{FF2B5EF4-FFF2-40B4-BE49-F238E27FC236}">
+                <a16:creationId xmlns:a16="http://schemas.microsoft.com/office/drawing/2014/main" id="{2FE9F491-219E-445E-AC35-B106CBF25757}"/>
+              </a:ext>
+            </a:extLst>
+          </p:cNvPr>
+          <p:cNvSpPr>
+            <a:spLocks noGrp="1"/>
+          </p:cNvSpPr>
+          <p:nvPr>
+            <p:ph type="title"/>
+          </p:nvPr>
+        </p:nvSpPr>
+        <p:spPr>
+          <a:xfrm>
+            <a:off x="1065197" y="5120640"/>
+            <a:ext cx="10058400" cy="822960"/>
+          </a:xfrm>
+        </p:spPr>
+        <p:txBody>
+          <a:bodyPr vert="horz" lIns="91440" tIns="45720" rIns="91440" bIns="45720" rtlCol="0" anchor="b">
+            <a:normAutofit fontScale="90000"/>
+          </a:bodyPr>
+          <a:lstStyle/>
+          <a:p>
+            <a:r>
+              <a:rPr lang="en-US" dirty="0"/>
+              <a:t>Ha </a:t>
+            </a:r>
+            <a:r>
+              <a:rPr lang="en-US" dirty="0" err="1"/>
+              <a:t>mindent</a:t>
+            </a:r>
+            <a:r>
+              <a:rPr lang="en-US" dirty="0"/>
+              <a:t> </a:t>
+            </a:r>
+            <a:r>
+              <a:rPr lang="en-US" dirty="0" err="1"/>
+              <a:t>jól</a:t>
+            </a:r>
+            <a:r>
+              <a:rPr lang="en-US" dirty="0"/>
+              <a:t> </a:t>
+            </a:r>
+            <a:r>
+              <a:rPr lang="en-US" dirty="0" err="1"/>
+              <a:t>csináltatok</a:t>
+            </a:r>
+            <a:r>
+              <a:rPr lang="en-US" dirty="0"/>
+              <a:t>, </a:t>
+            </a:r>
+            <a:r>
+              <a:rPr lang="en-US" dirty="0" err="1"/>
+              <a:t>akkor</a:t>
+            </a:r>
+            <a:r>
+              <a:rPr lang="en-US" dirty="0"/>
+              <a:t> </a:t>
+            </a:r>
+            <a:r>
+              <a:rPr lang="en-US" dirty="0" err="1"/>
+              <a:t>ez</a:t>
+            </a:r>
+            <a:r>
+              <a:rPr lang="en-US" dirty="0"/>
+              <a:t> </a:t>
+            </a:r>
+            <a:r>
+              <a:rPr lang="en-US" dirty="0" err="1"/>
+              <a:t>kell</a:t>
+            </a:r>
+            <a:r>
+              <a:rPr lang="en-US" dirty="0"/>
+              <a:t> </a:t>
+            </a:r>
+            <a:r>
+              <a:rPr lang="en-US" dirty="0" err="1"/>
+              <a:t>legyen</a:t>
+            </a:r>
+            <a:r>
+              <a:rPr lang="en-US" dirty="0"/>
+              <a:t> </a:t>
+            </a:r>
+            <a:r>
+              <a:rPr lang="en-US" dirty="0" err="1"/>
+              <a:t>az</a:t>
+            </a:r>
+            <a:r>
+              <a:rPr lang="en-US" dirty="0"/>
+              <a:t> </a:t>
+            </a:r>
+            <a:r>
+              <a:rPr lang="en-US" dirty="0" err="1"/>
+              <a:t>eredmény</a:t>
+            </a:r>
+            <a:endParaRPr lang="en-US" dirty="0"/>
+          </a:p>
+        </p:txBody>
+      </p:sp>
+    </p:spTree>
+    <p:extLst>
+      <p:ext uri="{BB962C8B-B14F-4D97-AF65-F5344CB8AC3E}">
+        <p14:creationId xmlns:p14="http://schemas.microsoft.com/office/powerpoint/2010/main" val="2528886637"/>
+      </p:ext>
+    </p:extLst>
+  </p:cSld>
+  <p:clrMapOvr>
+    <a:masterClrMapping/>
+  </p:clrMapOvr>
+</p:sld>
+</file>
+
 <file path=ppt/slides/slide2.xml><?xml version="1.0" encoding="utf-8"?>
 <p:sld xmlns:a="http://schemas.openxmlformats.org/drawingml/2006/main" xmlns:r="http://schemas.openxmlformats.org/officeDocument/2006/relationships" xmlns:p="http://schemas.openxmlformats.org/presentationml/2006/main">
   <p:cSld>
@@ -4572,13 +5138,29 @@
             </a:r>
             <a:r>
               <a:rPr lang="en-US" dirty="0" err="1">
-                <a:hlinkClick r:id="rId2"/>
+                <a:hlinkClick r:id="rId3"/>
               </a:rPr>
               <a:t>leírás</a:t>
             </a:r>
             <a:r>
               <a:rPr lang="en-US" dirty="0"/>
-              <a:t>.</a:t>
+              <a:t>. </a:t>
+            </a:r>
+            <a:r>
+              <a:rPr lang="en-US" dirty="0" err="1"/>
+              <a:t>Példa</a:t>
+            </a:r>
+            <a:r>
+              <a:rPr lang="en-US" dirty="0"/>
+              <a:t>: </a:t>
+            </a:r>
+            <a:r>
+              <a:rPr lang="en-US" i="1" dirty="0"/>
+              <a:t>Shadow Man</a:t>
+            </a:r>
+            <a:r>
+              <a:rPr lang="en-US" dirty="0"/>
+              <a:t> (1999)</a:t>
             </a:r>
           </a:p>
           <a:p>
@@ -4592,39 +5174,7 @@
             </a:r>
             <a:r>
               <a:rPr lang="en-US" dirty="0"/>
-              <a:t>: 2002 </a:t>
-            </a:r>
-            <a:r>
-              <a:rPr lang="en-US" dirty="0" err="1"/>
-              <a:t>körül</a:t>
-            </a:r>
-            <a:r>
-              <a:rPr lang="en-US" dirty="0"/>
-              <a:t> </a:t>
-            </a:r>
-            <a:r>
-              <a:rPr lang="en-US" dirty="0" err="1"/>
-              <a:t>kezdett</a:t>
-            </a:r>
-            <a:r>
-              <a:rPr lang="en-US" dirty="0"/>
-              <a:t> </a:t>
-            </a:r>
-            <a:r>
-              <a:rPr lang="en-US" dirty="0" err="1"/>
-              <a:t>érdemben</a:t>
-            </a:r>
-            <a:r>
-              <a:rPr lang="en-US" dirty="0"/>
-              <a:t> </a:t>
-            </a:r>
-            <a:r>
-              <a:rPr lang="en-US" dirty="0" err="1"/>
-              <a:t>elterjedni</a:t>
-            </a:r>
-            <a:r>
-              <a:rPr lang="en-US" dirty="0"/>
-              <a:t>; a </a:t>
+              <a:t>: a </a:t>
             </a:r>
             <a:r>
               <a:rPr lang="en-US" dirty="0" err="1"/>
@@ -4668,7 +5218,7 @@
             </a:r>
             <a:r>
               <a:rPr lang="en-US" dirty="0" err="1"/>
-              <a:t>árnyéktestet</a:t>
+              <a:t>árnyéktesteket</a:t>
             </a:r>
             <a:r>
               <a:rPr lang="en-US" dirty="0"/>
@@ -4765,6 +5315,46 @@
             <a:r>
               <a:rPr lang="en-US" dirty="0" err="1"/>
               <a:t>csinálni</a:t>
+            </a:r>
+            <a:r>
+              <a:rPr lang="en-US" dirty="0"/>
+              <a:t>, ill. </a:t>
+            </a:r>
+            <a:r>
+              <a:rPr lang="en-US" dirty="0" err="1"/>
+              <a:t>minden</a:t>
+            </a:r>
+            <a:r>
+              <a:rPr lang="en-US" dirty="0"/>
+              <a:t> </a:t>
+            </a:r>
+            <a:r>
+              <a:rPr lang="en-US" dirty="0" err="1"/>
+              <a:t>objektumnak</a:t>
+            </a:r>
+            <a:r>
+              <a:rPr lang="en-US" dirty="0"/>
+              <a:t> </a:t>
+            </a:r>
+            <a:r>
+              <a:rPr lang="en-US" dirty="0" err="1"/>
+              <a:t>árnyékot</a:t>
+            </a:r>
+            <a:r>
+              <a:rPr lang="en-US" dirty="0"/>
+              <a:t> </a:t>
+            </a:r>
+            <a:r>
+              <a:rPr lang="en-US" dirty="0" err="1"/>
+              <a:t>kell</a:t>
+            </a:r>
+            <a:r>
+              <a:rPr lang="en-US" dirty="0"/>
+              <a:t> </a:t>
+            </a:r>
+            <a:r>
+              <a:rPr lang="en-US" dirty="0" err="1"/>
+              <a:t>vetnie</a:t>
             </a:r>
             <a:r>
               <a:rPr lang="en-US" dirty="0"/>
@@ -5106,25 +5696,97 @@
               <a:rPr lang="en-US" i="1" dirty="0">
                 <a:sym typeface="Wingdings" panose="05000000000000000000" pitchFamily="2" charset="2"/>
               </a:rPr>
-              <a:t>(FYI: shading = </a:t>
+              <a:t>(FYI: </a:t>
             </a:r>
             <a:r>
               <a:rPr lang="en-US" i="1" dirty="0" err="1">
                 <a:sym typeface="Wingdings" panose="05000000000000000000" pitchFamily="2" charset="2"/>
               </a:rPr>
-              <a:t>árnyalás</a:t>
+              <a:t>maguk</a:t>
             </a:r>
             <a:r>
               <a:rPr lang="en-US" i="1" dirty="0">
                 <a:sym typeface="Wingdings" panose="05000000000000000000" pitchFamily="2" charset="2"/>
               </a:rPr>
-              <a:t>, shadowing = </a:t>
+              <a:t> a </a:t>
             </a:r>
             <a:r>
               <a:rPr lang="en-US" i="1" dirty="0" err="1">
                 <a:sym typeface="Wingdings" panose="05000000000000000000" pitchFamily="2" charset="2"/>
               </a:rPr>
-              <a:t>árnyékolás</a:t>
+              <a:t>módszerek</a:t>
+            </a:r>
+            <a:r>
+              <a:rPr lang="en-US" i="1" dirty="0">
+                <a:sym typeface="Wingdings" panose="05000000000000000000" pitchFamily="2" charset="2"/>
+              </a:rPr>
+              <a:t> </a:t>
+            </a:r>
+            <a:r>
+              <a:rPr lang="en-US" i="1" dirty="0" err="1">
+                <a:sym typeface="Wingdings" panose="05000000000000000000" pitchFamily="2" charset="2"/>
+              </a:rPr>
+              <a:t>már</a:t>
+            </a:r>
+            <a:r>
+              <a:rPr lang="en-US" i="1" dirty="0">
+                <a:sym typeface="Wingdings" panose="05000000000000000000" pitchFamily="2" charset="2"/>
+              </a:rPr>
+              <a:t> a 70-es </a:t>
+            </a:r>
+            <a:r>
+              <a:rPr lang="en-US" i="1" dirty="0" err="1">
+                <a:sym typeface="Wingdings" panose="05000000000000000000" pitchFamily="2" charset="2"/>
+              </a:rPr>
+              <a:t>évek</a:t>
+            </a:r>
+            <a:r>
+              <a:rPr lang="en-US" i="1" dirty="0">
+                <a:sym typeface="Wingdings" panose="05000000000000000000" pitchFamily="2" charset="2"/>
+              </a:rPr>
+              <a:t> </a:t>
+            </a:r>
+            <a:r>
+              <a:rPr lang="en-US" i="1" dirty="0" err="1">
+                <a:sym typeface="Wingdings" panose="05000000000000000000" pitchFamily="2" charset="2"/>
+              </a:rPr>
+              <a:t>óta</a:t>
+            </a:r>
+            <a:r>
+              <a:rPr lang="en-US" i="1" dirty="0">
+                <a:sym typeface="Wingdings" panose="05000000000000000000" pitchFamily="2" charset="2"/>
+              </a:rPr>
+              <a:t> </a:t>
+            </a:r>
+            <a:r>
+              <a:rPr lang="en-US" i="1" dirty="0" err="1">
+                <a:sym typeface="Wingdings" panose="05000000000000000000" pitchFamily="2" charset="2"/>
+              </a:rPr>
+              <a:t>léteznek</a:t>
+            </a:r>
+            <a:r>
+              <a:rPr lang="en-US" i="1" dirty="0">
+                <a:sym typeface="Wingdings" panose="05000000000000000000" pitchFamily="2" charset="2"/>
+              </a:rPr>
+              <a:t> </a:t>
+            </a:r>
+            <a:r>
+              <a:rPr lang="en-US" i="1" dirty="0" err="1">
+                <a:sym typeface="Wingdings" panose="05000000000000000000" pitchFamily="2" charset="2"/>
+              </a:rPr>
+              <a:t>és</a:t>
+            </a:r>
+            <a:r>
+              <a:rPr lang="en-US" i="1" dirty="0">
+                <a:sym typeface="Wingdings" panose="05000000000000000000" pitchFamily="2" charset="2"/>
+              </a:rPr>
+              <a:t> </a:t>
+            </a:r>
+            <a:r>
+              <a:rPr lang="en-US" i="1" dirty="0" err="1">
+                <a:sym typeface="Wingdings" panose="05000000000000000000" pitchFamily="2" charset="2"/>
+              </a:rPr>
+              <a:t>használatosak</a:t>
             </a:r>
             <a:r>
               <a:rPr lang="en-US" i="1" dirty="0">
@@ -5298,6 +5960,16 @@
               <a:rPr lang="en-US" dirty="0" err="1"/>
               <a:t>használatát</a:t>
             </a:r>
+            <a:r>
+              <a:rPr lang="en-US" dirty="0"/>
+              <a:t>. Ld. </a:t>
+            </a:r>
+            <a:r>
+              <a:rPr lang="en-US" dirty="0">
+                <a:hlinkClick r:id="rId2"/>
+              </a:rPr>
+              <a:t>GPU Gems 3</a:t>
+            </a:r>
             <a:endParaRPr lang="en-US" dirty="0"/>
           </a:p>
           <a:p>
@@ -5603,7 +6275,7 @@
           <p:nvPr/>
         </p:nvPicPr>
         <p:blipFill rotWithShape="1">
-          <a:blip r:embed="rId2">
+          <a:blip r:embed="rId3">
             <a:extLst>
               <a:ext uri="{28A0092B-C50C-407E-A947-70E740481C1C}">
                 <a14:useLocalDpi xmlns:a14="http://schemas.microsoft.com/office/drawing/2010/main" val="0"/>
@@ -5700,7 +6372,9 @@
         </p:nvSpPr>
         <p:spPr/>
         <p:txBody>
-          <a:bodyPr/>
+          <a:bodyPr>
+            <a:normAutofit lnSpcReduction="10000"/>
+          </a:bodyPr>
           <a:lstStyle/>
           <a:p>
             <a:pPr>
@@ -5968,7 +6642,7 @@
             </a:r>
             <a:r>
               <a:rPr lang="en-US" dirty="0"/>
-              <a:t> meg </a:t>
+              <a:t> </a:t>
             </a:r>
             <a:r>
               <a:rPr lang="en-US" dirty="0" err="1"/>
@@ -6107,7 +6781,7 @@
             </a:pPr>
             <a:r>
               <a:rPr lang="en-US" dirty="0"/>
-              <a:t>A CPU </a:t>
+              <a:t>…a CPU </a:t>
             </a:r>
             <a:r>
               <a:rPr lang="en-US" dirty="0" err="1"/>
@@ -6316,7 +6990,7 @@
             </a:r>
             <a:r>
               <a:rPr lang="en-US" dirty="0"/>
-              <a:t>… </a:t>
+              <a:t> is… </a:t>
             </a:r>
             <a:r>
               <a:rPr lang="en-US" dirty="0">
@@ -6333,7 +7007,39 @@
             </a:pPr>
             <a:r>
               <a:rPr lang="en-US" dirty="0" err="1"/>
-              <a:t>Előre</a:t>
+              <a:t>Nem</a:t>
+            </a:r>
+            <a:r>
+              <a:rPr lang="en-US" dirty="0"/>
+              <a:t> </a:t>
+            </a:r>
+            <a:r>
+              <a:rPr lang="en-US" dirty="0" err="1"/>
+              <a:t>egy</a:t>
+            </a:r>
+            <a:r>
+              <a:rPr lang="en-US" dirty="0"/>
+              <a:t> </a:t>
+            </a:r>
+            <a:r>
+              <a:rPr lang="en-US" dirty="0" err="1"/>
+              <a:t>egetrengető</a:t>
+            </a:r>
+            <a:r>
+              <a:rPr lang="en-US" dirty="0"/>
+              <a:t> </a:t>
+            </a:r>
+            <a:r>
+              <a:rPr lang="en-US" dirty="0" err="1"/>
+              <a:t>dolog</a:t>
+            </a:r>
+            <a:r>
+              <a:rPr lang="en-US" dirty="0"/>
+              <a:t>, de </a:t>
+            </a:r>
+            <a:r>
+              <a:rPr lang="en-US" dirty="0" err="1"/>
+              <a:t>előre</a:t>
             </a:r>
             <a:r>
               <a:rPr lang="en-US" dirty="0"/>
@@ -6345,31 +7051,90 @@
             </a:r>
             <a:r>
               <a:rPr lang="en-US" dirty="0"/>
-              <a:t>; </a:t>
+              <a:t> (</a:t>
+            </a:r>
+            <a:r>
+              <a:rPr lang="en-US" dirty="0" err="1"/>
+              <a:t>mert</a:t>
+            </a:r>
+            <a:r>
+              <a:rPr lang="en-US" dirty="0"/>
+              <a:t> </a:t>
+            </a:r>
+            <a:r>
+              <a:rPr lang="en-US" dirty="0" err="1"/>
+              <a:t>ilyen</a:t>
+            </a:r>
+            <a:r>
+              <a:rPr lang="en-US" dirty="0"/>
+              <a:t> </a:t>
+            </a:r>
+            <a:r>
+              <a:rPr lang="en-US" dirty="0" err="1"/>
+              <a:t>rendes</a:t>
+            </a:r>
+            <a:r>
+              <a:rPr lang="en-US" dirty="0"/>
+              <a:t> </a:t>
+            </a:r>
+            <a:r>
+              <a:rPr lang="en-US" dirty="0" err="1"/>
+              <a:t>vagyok</a:t>
+            </a:r>
+            <a:r>
+              <a:rPr lang="en-US" dirty="0"/>
+              <a:t>)</a:t>
+            </a:r>
+          </a:p>
+          <a:p>
+            <a:pPr>
+              <a:buFont typeface="Wingdings" panose="05000000000000000000" pitchFamily="2" charset="2"/>
+              <a:buChar char="§"/>
+            </a:pPr>
+            <a:r>
+              <a:rPr lang="en-US" b="1" dirty="0" err="1"/>
+              <a:t>Feladat</a:t>
+            </a:r>
+            <a:r>
+              <a:rPr lang="en-US" dirty="0"/>
+              <a:t>: </a:t>
+            </a:r>
+            <a:r>
+              <a:rPr lang="en-US" dirty="0" err="1"/>
+              <a:t>implementáld</a:t>
+            </a:r>
+            <a:r>
+              <a:rPr lang="en-US" dirty="0"/>
+              <a:t> le a </a:t>
             </a:r>
             <a:r>
               <a:rPr lang="en-US" i="1" dirty="0"/>
-              <a:t>2-manifold</a:t>
-            </a:r>
-            <a:r>
-              <a:rPr lang="en-US" dirty="0"/>
-              <a:t>-okra “</a:t>
-            </a:r>
-            <a:r>
-              <a:rPr lang="en-US" dirty="0" err="1"/>
-              <a:t>triviális</a:t>
-            </a:r>
-            <a:r>
-              <a:rPr lang="en-US" dirty="0"/>
-              <a:t>”</a:t>
-            </a:r>
-          </a:p>
-          <a:p>
-            <a:pPr lvl="1">
-              <a:buFont typeface="Wingdings" panose="05000000000000000000" pitchFamily="2" charset="2"/>
-              <a:buChar char="q"/>
-            </a:pPr>
-            <a:endParaRPr lang="en-US" dirty="0"/>
+              <a:t>geometry </a:t>
+            </a:r>
+            <a:r>
+              <a:rPr lang="en-US" i="1" dirty="0" err="1"/>
+              <a:t>shader</a:t>
+            </a:r>
+            <a:r>
+              <a:rPr lang="en-US" dirty="0"/>
+              <a:t> </a:t>
+            </a:r>
+            <a:r>
+              <a:rPr lang="en-US" dirty="0" err="1"/>
+              <a:t>hiányzó</a:t>
+            </a:r>
+            <a:r>
+              <a:rPr lang="en-US" dirty="0"/>
+              <a:t> </a:t>
+            </a:r>
+            <a:r>
+              <a:rPr lang="en-US" dirty="0" err="1"/>
+              <a:t>részeit</a:t>
+            </a:r>
+            <a:r>
+              <a:rPr lang="en-US" dirty="0"/>
+              <a:t>!</a:t>
+            </a:r>
           </a:p>
           <a:p>
             <a:pPr>
@@ -6394,6 +7159,708 @@
 </file>
 
 <file path=ppt/slides/slide5.xml><?xml version="1.0" encoding="utf-8"?>
+<p:sld xmlns:a="http://schemas.openxmlformats.org/drawingml/2006/main" xmlns:r="http://schemas.openxmlformats.org/officeDocument/2006/relationships" xmlns:p="http://schemas.openxmlformats.org/presentationml/2006/main">
+  <p:cSld>
+    <p:spTree>
+      <p:nvGrpSpPr>
+        <p:cNvPr id="1" name=""/>
+        <p:cNvGrpSpPr/>
+        <p:nvPr/>
+      </p:nvGrpSpPr>
+      <p:grpSpPr>
+        <a:xfrm>
+          <a:off x="0" y="0"/>
+          <a:ext cx="0" cy="0"/>
+          <a:chOff x="0" y="0"/>
+          <a:chExt cx="0" cy="0"/>
+        </a:xfrm>
+      </p:grpSpPr>
+      <p:sp>
+        <p:nvSpPr>
+          <p:cNvPr id="2" name="Title 1">
+            <a:extLst>
+              <a:ext uri="{FF2B5EF4-FFF2-40B4-BE49-F238E27FC236}">
+                <a16:creationId xmlns:a16="http://schemas.microsoft.com/office/drawing/2014/main" id="{B5DFD2DD-590D-45E8-82B5-0A353B9F0A4F}"/>
+              </a:ext>
+            </a:extLst>
+          </p:cNvPr>
+          <p:cNvSpPr>
+            <a:spLocks noGrp="1"/>
+          </p:cNvSpPr>
+          <p:nvPr>
+            <p:ph type="title"/>
+          </p:nvPr>
+        </p:nvSpPr>
+        <p:spPr/>
+        <p:txBody>
+          <a:bodyPr/>
+          <a:lstStyle/>
+          <a:p>
+            <a:r>
+              <a:rPr lang="en-US" dirty="0" err="1"/>
+              <a:t>Meggondolások</a:t>
+            </a:r>
+            <a:endParaRPr lang="hu-HU" dirty="0"/>
+          </a:p>
+        </p:txBody>
+      </p:sp>
+      <p:sp>
+        <p:nvSpPr>
+          <p:cNvPr id="3" name="Content Placeholder 2">
+            <a:extLst>
+              <a:ext uri="{FF2B5EF4-FFF2-40B4-BE49-F238E27FC236}">
+                <a16:creationId xmlns:a16="http://schemas.microsoft.com/office/drawing/2014/main" id="{4C14D50F-10B1-49B2-85EA-9F48CEA84890}"/>
+              </a:ext>
+            </a:extLst>
+          </p:cNvPr>
+          <p:cNvSpPr>
+            <a:spLocks noGrp="1"/>
+          </p:cNvSpPr>
+          <p:nvPr>
+            <p:ph idx="1"/>
+          </p:nvPr>
+        </p:nvSpPr>
+        <p:spPr/>
+        <p:txBody>
+          <a:bodyPr>
+            <a:normAutofit lnSpcReduction="10000"/>
+          </a:bodyPr>
+          <a:lstStyle/>
+          <a:p>
+            <a:pPr>
+              <a:buFont typeface="Wingdings" panose="05000000000000000000" pitchFamily="2" charset="2"/>
+              <a:buChar char="§"/>
+            </a:pPr>
+            <a:r>
+              <a:rPr lang="en-US" dirty="0"/>
+              <a:t>A </a:t>
+            </a:r>
+            <a:r>
+              <a:rPr lang="en-US" i="1" dirty="0"/>
+              <a:t>shadow volume</a:t>
+            </a:r>
+            <a:r>
+              <a:rPr lang="en-US" dirty="0"/>
+              <a:t>-</a:t>
+            </a:r>
+            <a:r>
+              <a:rPr lang="en-US" dirty="0" err="1"/>
+              <a:t>ot</a:t>
+            </a:r>
+            <a:r>
+              <a:rPr lang="en-US" dirty="0"/>
+              <a:t> be </a:t>
+            </a:r>
+            <a:r>
+              <a:rPr lang="en-US" dirty="0" err="1"/>
+              <a:t>kell</a:t>
+            </a:r>
+            <a:r>
+              <a:rPr lang="en-US" dirty="0"/>
+              <a:t> </a:t>
+            </a:r>
+            <a:r>
+              <a:rPr lang="en-US" dirty="0" err="1"/>
+              <a:t>fedni</a:t>
+            </a:r>
+            <a:r>
+              <a:rPr lang="en-US" dirty="0"/>
+              <a:t> (</a:t>
+            </a:r>
+            <a:r>
+              <a:rPr lang="en-US" i="1" dirty="0"/>
+              <a:t>front/back cap</a:t>
+            </a:r>
+            <a:r>
+              <a:rPr lang="en-US" dirty="0"/>
+              <a:t>), </a:t>
+            </a:r>
+            <a:r>
+              <a:rPr lang="en-US" dirty="0" err="1"/>
+              <a:t>ez</a:t>
+            </a:r>
+            <a:r>
+              <a:rPr lang="en-US" dirty="0"/>
+              <a:t> </a:t>
+            </a:r>
+            <a:r>
+              <a:rPr lang="en-US" dirty="0" err="1"/>
+              <a:t>könnyen</a:t>
+            </a:r>
+            <a:r>
+              <a:rPr lang="en-US" dirty="0"/>
+              <a:t> </a:t>
+            </a:r>
+            <a:r>
+              <a:rPr lang="en-US" dirty="0" err="1"/>
+              <a:t>megtehető</a:t>
+            </a:r>
+            <a:endParaRPr lang="en-US" dirty="0"/>
+          </a:p>
+          <a:p>
+            <a:pPr lvl="1">
+              <a:buFont typeface="Wingdings" panose="05000000000000000000" pitchFamily="2" charset="2"/>
+              <a:buChar char="q"/>
+            </a:pPr>
+            <a:r>
+              <a:rPr lang="en-US" i="1" dirty="0"/>
+              <a:t>Front cap</a:t>
+            </a:r>
+            <a:r>
+              <a:rPr lang="en-US" dirty="0"/>
+              <a:t>: a </a:t>
+            </a:r>
+            <a:r>
+              <a:rPr lang="en-US" dirty="0" err="1"/>
+              <a:t>fény</a:t>
+            </a:r>
+            <a:r>
+              <a:rPr lang="en-US" dirty="0"/>
+              <a:t> </a:t>
+            </a:r>
+            <a:r>
+              <a:rPr lang="en-US" dirty="0" err="1"/>
+              <a:t>felé</a:t>
+            </a:r>
+            <a:r>
+              <a:rPr lang="en-US" dirty="0"/>
+              <a:t> </a:t>
+            </a:r>
+            <a:r>
+              <a:rPr lang="en-US" dirty="0" err="1"/>
+              <a:t>néző</a:t>
+            </a:r>
+            <a:r>
+              <a:rPr lang="en-US" dirty="0"/>
+              <a:t> </a:t>
+            </a:r>
+            <a:r>
+              <a:rPr lang="en-US" dirty="0" err="1"/>
+              <a:t>háromszögek</a:t>
+            </a:r>
+            <a:endParaRPr lang="en-US" dirty="0"/>
+          </a:p>
+          <a:p>
+            <a:pPr lvl="1">
+              <a:buFont typeface="Wingdings" panose="05000000000000000000" pitchFamily="2" charset="2"/>
+              <a:buChar char="q"/>
+            </a:pPr>
+            <a:r>
+              <a:rPr lang="en-US" i="1" dirty="0"/>
+              <a:t>Back cap</a:t>
+            </a:r>
+            <a:r>
+              <a:rPr lang="en-US" dirty="0"/>
+              <a:t>: </a:t>
+            </a:r>
+            <a:r>
+              <a:rPr lang="en-US" dirty="0" err="1"/>
+              <a:t>ugyanezek</a:t>
+            </a:r>
+            <a:r>
+              <a:rPr lang="en-US" dirty="0"/>
+              <a:t> </a:t>
+            </a:r>
+            <a:r>
+              <a:rPr lang="en-US" dirty="0" err="1"/>
+              <a:t>fordított</a:t>
+            </a:r>
+            <a:r>
+              <a:rPr lang="en-US" dirty="0"/>
+              <a:t> </a:t>
+            </a:r>
+            <a:r>
+              <a:rPr lang="en-US" dirty="0" err="1"/>
+              <a:t>bejárással</a:t>
+            </a:r>
+            <a:r>
+              <a:rPr lang="en-US" dirty="0"/>
+              <a:t>, </a:t>
+            </a:r>
+            <a:r>
+              <a:rPr lang="en-US" dirty="0" err="1"/>
+              <a:t>fényirányban</a:t>
+            </a:r>
+            <a:r>
+              <a:rPr lang="en-US" dirty="0"/>
+              <a:t> </a:t>
+            </a:r>
+            <a:r>
+              <a:rPr lang="en-US" dirty="0" err="1"/>
+              <a:t>kivetítve</a:t>
+            </a:r>
+            <a:r>
+              <a:rPr lang="en-US" dirty="0"/>
+              <a:t> a </a:t>
+            </a:r>
+            <a:r>
+              <a:rPr lang="en-US" dirty="0" err="1"/>
+              <a:t>végtelenbe</a:t>
+            </a:r>
+            <a:r>
+              <a:rPr lang="en-US" dirty="0"/>
+              <a:t> (w = 0)</a:t>
+            </a:r>
+          </a:p>
+          <a:p>
+            <a:pPr>
+              <a:buFont typeface="Wingdings" panose="05000000000000000000" pitchFamily="2" charset="2"/>
+              <a:buChar char="§"/>
+            </a:pPr>
+            <a:r>
+              <a:rPr lang="en-US" dirty="0"/>
+              <a:t>De </a:t>
+            </a:r>
+            <a:r>
+              <a:rPr lang="en-US" dirty="0" err="1"/>
+              <a:t>az</a:t>
+            </a:r>
+            <a:r>
+              <a:rPr lang="en-US" dirty="0"/>
+              <a:t> </a:t>
+            </a:r>
+            <a:r>
+              <a:rPr lang="en-US" dirty="0" err="1"/>
+              <a:t>eredeti</a:t>
+            </a:r>
+            <a:r>
+              <a:rPr lang="en-US" dirty="0"/>
+              <a:t> </a:t>
+            </a:r>
+            <a:r>
+              <a:rPr lang="en-US" dirty="0" err="1"/>
+              <a:t>objektum</a:t>
+            </a:r>
+            <a:r>
+              <a:rPr lang="en-US" dirty="0"/>
+              <a:t> </a:t>
+            </a:r>
+            <a:r>
+              <a:rPr lang="en-US" dirty="0" err="1"/>
+              <a:t>és</a:t>
+            </a:r>
+            <a:r>
+              <a:rPr lang="en-US" dirty="0"/>
+              <a:t> a </a:t>
+            </a:r>
+            <a:r>
+              <a:rPr lang="en-US" i="1" dirty="0"/>
+              <a:t>2-manifold</a:t>
+            </a:r>
+            <a:r>
+              <a:rPr lang="en-US" dirty="0"/>
+              <a:t> </a:t>
+            </a:r>
+            <a:r>
+              <a:rPr lang="en-US" dirty="0" err="1"/>
+              <a:t>nem</a:t>
+            </a:r>
+            <a:r>
+              <a:rPr lang="en-US" dirty="0"/>
+              <a:t> </a:t>
+            </a:r>
+            <a:r>
+              <a:rPr lang="en-US" dirty="0" err="1"/>
+              <a:t>egyezik</a:t>
+            </a:r>
+            <a:r>
+              <a:rPr lang="en-US" dirty="0"/>
+              <a:t> meg, </a:t>
+            </a:r>
+            <a:r>
+              <a:rPr lang="en-US" dirty="0" err="1"/>
+              <a:t>ettől</a:t>
+            </a:r>
+            <a:r>
+              <a:rPr lang="en-US" dirty="0"/>
+              <a:t> a </a:t>
+            </a:r>
+            <a:r>
+              <a:rPr lang="en-US" i="1" dirty="0"/>
+              <a:t>front cap</a:t>
+            </a:r>
+            <a:r>
+              <a:rPr lang="en-US" dirty="0"/>
+              <a:t> </a:t>
+            </a:r>
+            <a:r>
+              <a:rPr lang="en-US" i="1" dirty="0" err="1"/>
+              <a:t>zfight</a:t>
+            </a:r>
+            <a:r>
+              <a:rPr lang="en-US" dirty="0" err="1"/>
+              <a:t>-olni</a:t>
+            </a:r>
+            <a:r>
+              <a:rPr lang="en-US" dirty="0"/>
+              <a:t> fog</a:t>
+            </a:r>
+          </a:p>
+          <a:p>
+            <a:pPr>
+              <a:buFont typeface="Wingdings" panose="05000000000000000000" pitchFamily="2" charset="2"/>
+              <a:buChar char="§"/>
+            </a:pPr>
+            <a:r>
+              <a:rPr lang="en-US" dirty="0"/>
+              <a:t>“</a:t>
+            </a:r>
+            <a:r>
+              <a:rPr lang="en-US" dirty="0" err="1"/>
+              <a:t>Megoldás</a:t>
+            </a:r>
+            <a:r>
+              <a:rPr lang="en-US" dirty="0"/>
+              <a:t>” (</a:t>
+            </a:r>
+            <a:r>
+              <a:rPr lang="en-US" dirty="0" err="1"/>
+              <a:t>csalás</a:t>
+            </a:r>
+            <a:r>
+              <a:rPr lang="en-US" dirty="0"/>
+              <a:t>): </a:t>
+            </a:r>
+            <a:r>
+              <a:rPr lang="en-US" dirty="0" err="1"/>
+              <a:t>vedd</a:t>
+            </a:r>
+            <a:r>
+              <a:rPr lang="en-US" dirty="0"/>
+              <a:t> </a:t>
+            </a:r>
+            <a:r>
+              <a:rPr lang="en-US" dirty="0" err="1"/>
+              <a:t>kisebbre</a:t>
+            </a:r>
+            <a:r>
+              <a:rPr lang="en-US" dirty="0"/>
+              <a:t>, mint </a:t>
+            </a:r>
+            <a:r>
+              <a:rPr lang="en-US" dirty="0" err="1"/>
+              <a:t>az</a:t>
+            </a:r>
+            <a:r>
+              <a:rPr lang="en-US" dirty="0"/>
+              <a:t> </a:t>
+            </a:r>
+            <a:r>
+              <a:rPr lang="en-US" dirty="0" err="1"/>
+              <a:t>eredeti</a:t>
+            </a:r>
+            <a:r>
+              <a:rPr lang="en-US" dirty="0"/>
+              <a:t> </a:t>
+            </a:r>
+            <a:r>
+              <a:rPr lang="en-US" dirty="0" err="1"/>
+              <a:t>objektum</a:t>
+            </a:r>
+            <a:endParaRPr lang="en-US" dirty="0"/>
+          </a:p>
+          <a:p>
+            <a:pPr>
+              <a:buFont typeface="Wingdings" panose="05000000000000000000" pitchFamily="2" charset="2"/>
+              <a:buChar char="§"/>
+            </a:pPr>
+            <a:r>
+              <a:rPr lang="en-US" dirty="0"/>
+              <a:t>A </a:t>
+            </a:r>
+            <a:r>
+              <a:rPr lang="en-US" i="1" dirty="0"/>
+              <a:t>back cap</a:t>
+            </a:r>
+            <a:r>
+              <a:rPr lang="en-US" dirty="0"/>
+              <a:t> is </a:t>
+            </a:r>
+            <a:r>
+              <a:rPr lang="en-US" i="1" dirty="0" err="1"/>
+              <a:t>zfight</a:t>
+            </a:r>
+            <a:r>
+              <a:rPr lang="en-US" dirty="0" err="1"/>
+              <a:t>-olhat</a:t>
+            </a:r>
+            <a:r>
+              <a:rPr lang="en-US" dirty="0"/>
+              <a:t>, de </a:t>
+            </a:r>
+            <a:r>
+              <a:rPr lang="en-US" dirty="0" err="1"/>
+              <a:t>erre</a:t>
+            </a:r>
+            <a:r>
+              <a:rPr lang="en-US" dirty="0"/>
+              <a:t> </a:t>
+            </a:r>
+            <a:r>
+              <a:rPr lang="en-US" dirty="0" err="1"/>
+              <a:t>ott</a:t>
+            </a:r>
+            <a:r>
+              <a:rPr lang="en-US" dirty="0"/>
+              <a:t> van a </a:t>
+            </a:r>
+            <a:r>
+              <a:rPr lang="en-US" sz="1600" dirty="0">
+                <a:latin typeface="Consolas" panose="020B0609020204030204" pitchFamily="49" charset="0"/>
+              </a:rPr>
+              <a:t>GL_DEPTH_CLAMP</a:t>
+            </a:r>
+            <a:r>
+              <a:rPr lang="en-US" dirty="0"/>
+              <a:t> (</a:t>
+            </a:r>
+            <a:r>
+              <a:rPr lang="en-US" dirty="0" err="1"/>
+              <a:t>kikapcsolja</a:t>
+            </a:r>
+            <a:r>
+              <a:rPr lang="en-US" dirty="0"/>
+              <a:t> a </a:t>
+            </a:r>
+            <a:r>
+              <a:rPr lang="en-US" i="1" dirty="0"/>
+              <a:t>clipping</a:t>
+            </a:r>
+            <a:r>
+              <a:rPr lang="en-US" dirty="0"/>
+              <a:t>-et)</a:t>
+            </a:r>
+          </a:p>
+          <a:p>
+            <a:pPr>
+              <a:buFont typeface="Wingdings" panose="05000000000000000000" pitchFamily="2" charset="2"/>
+              <a:buChar char="§"/>
+            </a:pPr>
+            <a:r>
+              <a:rPr lang="en-US" dirty="0" err="1"/>
+              <a:t>Alternatíva</a:t>
+            </a:r>
+            <a:r>
+              <a:rPr lang="en-US" dirty="0"/>
+              <a:t>: a </a:t>
+            </a:r>
+            <a:r>
+              <a:rPr lang="en-US" dirty="0" err="1"/>
+              <a:t>projekciós</a:t>
+            </a:r>
+            <a:r>
+              <a:rPr lang="en-US" dirty="0"/>
+              <a:t> </a:t>
+            </a:r>
+            <a:r>
+              <a:rPr lang="en-US" dirty="0" err="1"/>
+              <a:t>mátrixot</a:t>
+            </a:r>
+            <a:r>
+              <a:rPr lang="en-US" dirty="0"/>
+              <a:t> </a:t>
+            </a:r>
+            <a:r>
+              <a:rPr lang="en-US" dirty="0" err="1"/>
+              <a:t>úgy</a:t>
+            </a:r>
+            <a:r>
+              <a:rPr lang="en-US" dirty="0"/>
+              <a:t> </a:t>
+            </a:r>
+            <a:r>
+              <a:rPr lang="en-US" dirty="0" err="1"/>
+              <a:t>módosítod</a:t>
+            </a:r>
+            <a:r>
+              <a:rPr lang="en-US" dirty="0"/>
+              <a:t>, </a:t>
+            </a:r>
+            <a:r>
+              <a:rPr lang="en-US" dirty="0" err="1"/>
+              <a:t>hogy</a:t>
+            </a:r>
+            <a:r>
+              <a:rPr lang="en-US" dirty="0"/>
+              <a:t> a </a:t>
+            </a:r>
+            <a:r>
+              <a:rPr lang="en-US" dirty="0" err="1"/>
+              <a:t>távoli</a:t>
+            </a:r>
+            <a:r>
+              <a:rPr lang="en-US" dirty="0"/>
+              <a:t> </a:t>
+            </a:r>
+            <a:r>
+              <a:rPr lang="en-US" dirty="0" err="1"/>
+              <a:t>vágósík</a:t>
+            </a:r>
+            <a:r>
+              <a:rPr lang="en-US" dirty="0"/>
+              <a:t> a </a:t>
+            </a:r>
+            <a:r>
+              <a:rPr lang="en-US" dirty="0" err="1"/>
+              <a:t>végtelenben</a:t>
+            </a:r>
+            <a:r>
+              <a:rPr lang="en-US" dirty="0"/>
+              <a:t> </a:t>
+            </a:r>
+            <a:r>
+              <a:rPr lang="en-US" dirty="0" err="1"/>
+              <a:t>legyen</a:t>
+            </a:r>
+            <a:endParaRPr lang="en-US" dirty="0"/>
+          </a:p>
+          <a:p>
+            <a:pPr>
+              <a:buFont typeface="Wingdings" panose="05000000000000000000" pitchFamily="2" charset="2"/>
+              <a:buChar char="§"/>
+            </a:pPr>
+            <a:endParaRPr lang="en-US" dirty="0"/>
+          </a:p>
+          <a:p>
+            <a:pPr>
+              <a:buFont typeface="Wingdings" panose="05000000000000000000" pitchFamily="2" charset="2"/>
+              <a:buChar char="§"/>
+            </a:pPr>
+            <a:r>
+              <a:rPr lang="en-US" dirty="0"/>
+              <a:t>A </a:t>
+            </a:r>
+            <a:r>
+              <a:rPr lang="en-US" dirty="0" err="1"/>
+              <a:t>palást</a:t>
+            </a:r>
+            <a:r>
+              <a:rPr lang="en-US" dirty="0"/>
+              <a:t> </a:t>
+            </a:r>
+            <a:r>
+              <a:rPr lang="en-US" dirty="0" err="1"/>
+              <a:t>hasonlóan</a:t>
+            </a:r>
+            <a:r>
+              <a:rPr lang="en-US" dirty="0"/>
+              <a:t> </a:t>
+            </a:r>
+            <a:r>
+              <a:rPr lang="en-US" dirty="0" err="1"/>
+              <a:t>áll</a:t>
+            </a:r>
+            <a:r>
+              <a:rPr lang="en-US" dirty="0"/>
+              <a:t> </a:t>
+            </a:r>
+            <a:r>
+              <a:rPr lang="en-US" dirty="0" err="1"/>
+              <a:t>elő</a:t>
+            </a:r>
+            <a:r>
+              <a:rPr lang="en-US" dirty="0"/>
+              <a:t> a </a:t>
+            </a:r>
+            <a:r>
+              <a:rPr lang="en-US" dirty="0" err="1"/>
+              <a:t>sziluettből</a:t>
+            </a:r>
+            <a:r>
+              <a:rPr lang="en-US" dirty="0"/>
+              <a:t>: </a:t>
+            </a:r>
+            <a:r>
+              <a:rPr lang="en-US" dirty="0" err="1"/>
+              <a:t>élvertexek</a:t>
+            </a:r>
+            <a:r>
+              <a:rPr lang="en-US" dirty="0"/>
+              <a:t> + </a:t>
+            </a:r>
+            <a:r>
+              <a:rPr lang="en-US" dirty="0" err="1"/>
+              <a:t>ezek</a:t>
+            </a:r>
+            <a:r>
+              <a:rPr lang="en-US" dirty="0"/>
+              <a:t> </a:t>
+            </a:r>
+            <a:r>
+              <a:rPr lang="en-US" dirty="0" err="1"/>
+              <a:t>kivetítve</a:t>
+            </a:r>
+            <a:r>
+              <a:rPr lang="en-US" dirty="0"/>
+              <a:t> a </a:t>
+            </a:r>
+            <a:r>
+              <a:rPr lang="en-US" dirty="0" err="1"/>
+              <a:t>fényirány</a:t>
+            </a:r>
+            <a:r>
+              <a:rPr lang="en-US" dirty="0"/>
+              <a:t> </a:t>
+            </a:r>
+            <a:r>
+              <a:rPr lang="en-US" dirty="0" err="1"/>
+              <a:t>mentén</a:t>
+            </a:r>
+            <a:endParaRPr lang="en-US" dirty="0"/>
+          </a:p>
+          <a:p>
+            <a:pPr>
+              <a:buFont typeface="Wingdings" panose="05000000000000000000" pitchFamily="2" charset="2"/>
+              <a:buChar char="§"/>
+            </a:pPr>
+            <a:r>
+              <a:rPr lang="en-US" dirty="0" err="1"/>
+              <a:t>Egyéb</a:t>
+            </a:r>
+            <a:r>
+              <a:rPr lang="en-US" dirty="0"/>
+              <a:t> </a:t>
+            </a:r>
+            <a:r>
+              <a:rPr lang="en-US" dirty="0" err="1"/>
+              <a:t>ötletekhez</a:t>
+            </a:r>
+            <a:r>
+              <a:rPr lang="en-US" dirty="0"/>
+              <a:t>, </a:t>
+            </a:r>
+            <a:r>
+              <a:rPr lang="en-US" dirty="0" err="1"/>
+              <a:t>optimalizációkhoz</a:t>
+            </a:r>
+            <a:r>
+              <a:rPr lang="en-US" dirty="0"/>
+              <a:t> ld. </a:t>
+            </a:r>
+            <a:r>
+              <a:rPr lang="en-US" dirty="0" err="1">
+                <a:hlinkClick r:id="rId2"/>
+              </a:rPr>
+              <a:t>Gamasutra</a:t>
+            </a:r>
+            <a:endParaRPr lang="hu-HU" dirty="0"/>
+          </a:p>
+        </p:txBody>
+      </p:sp>
+    </p:spTree>
+    <p:extLst>
+      <p:ext uri="{BB962C8B-B14F-4D97-AF65-F5344CB8AC3E}">
+        <p14:creationId xmlns:p14="http://schemas.microsoft.com/office/powerpoint/2010/main" val="2771125297"/>
+      </p:ext>
+    </p:extLst>
+  </p:cSld>
+  <p:clrMapOvr>
+    <a:masterClrMapping/>
+  </p:clrMapOvr>
+</p:sld>
+</file>
+
+<file path=ppt/slides/slide6.xml><?xml version="1.0" encoding="utf-8"?>
 <p:sld xmlns:a="http://schemas.openxmlformats.org/drawingml/2006/main" xmlns:r="http://schemas.openxmlformats.org/officeDocument/2006/relationships" xmlns:p="http://schemas.openxmlformats.org/presentationml/2006/main">
   <p:cSld>
     <p:spTree>
@@ -6733,623 +8200,6 @@
 </p:sld>
 </file>
 
-<file path=ppt/slides/slide6.xml><?xml version="1.0" encoding="utf-8"?>
-<p:sld xmlns:a="http://schemas.openxmlformats.org/drawingml/2006/main" xmlns:r="http://schemas.openxmlformats.org/officeDocument/2006/relationships" xmlns:p="http://schemas.openxmlformats.org/presentationml/2006/main">
-  <p:cSld>
-    <p:spTree>
-      <p:nvGrpSpPr>
-        <p:cNvPr id="1" name=""/>
-        <p:cNvGrpSpPr/>
-        <p:nvPr/>
-      </p:nvGrpSpPr>
-      <p:grpSpPr>
-        <a:xfrm>
-          <a:off x="0" y="0"/>
-          <a:ext cx="0" cy="0"/>
-          <a:chOff x="0" y="0"/>
-          <a:chExt cx="0" cy="0"/>
-        </a:xfrm>
-      </p:grpSpPr>
-      <p:sp>
-        <p:nvSpPr>
-          <p:cNvPr id="2" name="Title 1">
-            <a:extLst>
-              <a:ext uri="{FF2B5EF4-FFF2-40B4-BE49-F238E27FC236}">
-                <a16:creationId xmlns:a16="http://schemas.microsoft.com/office/drawing/2014/main" id="{B5DFD2DD-590D-45E8-82B5-0A353B9F0A4F}"/>
-              </a:ext>
-            </a:extLst>
-          </p:cNvPr>
-          <p:cNvSpPr>
-            <a:spLocks noGrp="1"/>
-          </p:cNvSpPr>
-          <p:nvPr>
-            <p:ph type="title"/>
-          </p:nvPr>
-        </p:nvSpPr>
-        <p:spPr/>
-        <p:txBody>
-          <a:bodyPr/>
-          <a:lstStyle/>
-          <a:p>
-            <a:r>
-              <a:rPr lang="en-US" dirty="0" err="1"/>
-              <a:t>Meggondolások</a:t>
-            </a:r>
-            <a:endParaRPr lang="hu-HU" dirty="0"/>
-          </a:p>
-        </p:txBody>
-      </p:sp>
-      <p:sp>
-        <p:nvSpPr>
-          <p:cNvPr id="3" name="Content Placeholder 2">
-            <a:extLst>
-              <a:ext uri="{FF2B5EF4-FFF2-40B4-BE49-F238E27FC236}">
-                <a16:creationId xmlns:a16="http://schemas.microsoft.com/office/drawing/2014/main" id="{4C14D50F-10B1-49B2-85EA-9F48CEA84890}"/>
-              </a:ext>
-            </a:extLst>
-          </p:cNvPr>
-          <p:cNvSpPr>
-            <a:spLocks noGrp="1"/>
-          </p:cNvSpPr>
-          <p:nvPr>
-            <p:ph idx="1"/>
-          </p:nvPr>
-        </p:nvSpPr>
-        <p:spPr/>
-        <p:txBody>
-          <a:bodyPr/>
-          <a:lstStyle/>
-          <a:p>
-            <a:pPr>
-              <a:buFont typeface="Wingdings" panose="05000000000000000000" pitchFamily="2" charset="2"/>
-              <a:buChar char="§"/>
-            </a:pPr>
-            <a:r>
-              <a:rPr lang="en-US" dirty="0"/>
-              <a:t>A </a:t>
-            </a:r>
-            <a:r>
-              <a:rPr lang="en-US" i="1" dirty="0"/>
-              <a:t>shadow volume</a:t>
-            </a:r>
-            <a:r>
-              <a:rPr lang="en-US" dirty="0"/>
-              <a:t>-</a:t>
-            </a:r>
-            <a:r>
-              <a:rPr lang="en-US" dirty="0" err="1"/>
-              <a:t>ot</a:t>
-            </a:r>
-            <a:r>
-              <a:rPr lang="en-US" dirty="0"/>
-              <a:t> be </a:t>
-            </a:r>
-            <a:r>
-              <a:rPr lang="en-US" dirty="0" err="1"/>
-              <a:t>kell</a:t>
-            </a:r>
-            <a:r>
-              <a:rPr lang="en-US" dirty="0"/>
-              <a:t> </a:t>
-            </a:r>
-            <a:r>
-              <a:rPr lang="en-US" dirty="0" err="1"/>
-              <a:t>fedni</a:t>
-            </a:r>
-            <a:r>
-              <a:rPr lang="en-US" dirty="0"/>
-              <a:t> (</a:t>
-            </a:r>
-            <a:r>
-              <a:rPr lang="en-US" i="1" dirty="0"/>
-              <a:t>front/back cap</a:t>
-            </a:r>
-            <a:r>
-              <a:rPr lang="en-US" dirty="0"/>
-              <a:t>), </a:t>
-            </a:r>
-            <a:r>
-              <a:rPr lang="en-US" dirty="0" err="1"/>
-              <a:t>ez</a:t>
-            </a:r>
-            <a:r>
-              <a:rPr lang="en-US" dirty="0"/>
-              <a:t> </a:t>
-            </a:r>
-            <a:r>
-              <a:rPr lang="en-US" dirty="0" err="1"/>
-              <a:t>könnyen</a:t>
-            </a:r>
-            <a:r>
-              <a:rPr lang="en-US" dirty="0"/>
-              <a:t> </a:t>
-            </a:r>
-            <a:r>
-              <a:rPr lang="en-US" dirty="0" err="1"/>
-              <a:t>megtehető</a:t>
-            </a:r>
-            <a:endParaRPr lang="en-US" dirty="0"/>
-          </a:p>
-          <a:p>
-            <a:pPr lvl="1">
-              <a:buFont typeface="Wingdings" panose="05000000000000000000" pitchFamily="2" charset="2"/>
-              <a:buChar char="q"/>
-            </a:pPr>
-            <a:r>
-              <a:rPr lang="en-US" i="1" dirty="0"/>
-              <a:t>Front cap</a:t>
-            </a:r>
-            <a:r>
-              <a:rPr lang="en-US" dirty="0"/>
-              <a:t>: a </a:t>
-            </a:r>
-            <a:r>
-              <a:rPr lang="en-US" dirty="0" err="1"/>
-              <a:t>fény</a:t>
-            </a:r>
-            <a:r>
-              <a:rPr lang="en-US" dirty="0"/>
-              <a:t> </a:t>
-            </a:r>
-            <a:r>
-              <a:rPr lang="en-US" dirty="0" err="1"/>
-              <a:t>felé</a:t>
-            </a:r>
-            <a:r>
-              <a:rPr lang="en-US" dirty="0"/>
-              <a:t> </a:t>
-            </a:r>
-            <a:r>
-              <a:rPr lang="en-US" dirty="0" err="1"/>
-              <a:t>néző</a:t>
-            </a:r>
-            <a:r>
-              <a:rPr lang="en-US" dirty="0"/>
-              <a:t> </a:t>
-            </a:r>
-            <a:r>
-              <a:rPr lang="en-US" dirty="0" err="1"/>
-              <a:t>háromszögek</a:t>
-            </a:r>
-            <a:endParaRPr lang="en-US" dirty="0"/>
-          </a:p>
-          <a:p>
-            <a:pPr lvl="1">
-              <a:buFont typeface="Wingdings" panose="05000000000000000000" pitchFamily="2" charset="2"/>
-              <a:buChar char="q"/>
-            </a:pPr>
-            <a:r>
-              <a:rPr lang="en-US" i="1" dirty="0"/>
-              <a:t>Back cap</a:t>
-            </a:r>
-            <a:r>
-              <a:rPr lang="en-US" dirty="0"/>
-              <a:t>: </a:t>
-            </a:r>
-            <a:r>
-              <a:rPr lang="en-US" dirty="0" err="1"/>
-              <a:t>ugyanezek</a:t>
-            </a:r>
-            <a:r>
-              <a:rPr lang="en-US" dirty="0"/>
-              <a:t> </a:t>
-            </a:r>
-            <a:r>
-              <a:rPr lang="en-US" dirty="0" err="1"/>
-              <a:t>fordított</a:t>
-            </a:r>
-            <a:r>
-              <a:rPr lang="en-US" dirty="0"/>
-              <a:t> </a:t>
-            </a:r>
-            <a:r>
-              <a:rPr lang="en-US" dirty="0" err="1"/>
-              <a:t>bejárással</a:t>
-            </a:r>
-            <a:r>
-              <a:rPr lang="en-US" dirty="0"/>
-              <a:t>, </a:t>
-            </a:r>
-            <a:r>
-              <a:rPr lang="en-US" dirty="0" err="1"/>
-              <a:t>fényirányban</a:t>
-            </a:r>
-            <a:r>
-              <a:rPr lang="en-US" dirty="0"/>
-              <a:t> </a:t>
-            </a:r>
-            <a:r>
-              <a:rPr lang="en-US" dirty="0" err="1"/>
-              <a:t>kivetítve</a:t>
-            </a:r>
-            <a:r>
-              <a:rPr lang="en-US" dirty="0"/>
-              <a:t> a </a:t>
-            </a:r>
-            <a:r>
-              <a:rPr lang="en-US" dirty="0" err="1"/>
-              <a:t>végtelenbe</a:t>
-            </a:r>
-            <a:r>
-              <a:rPr lang="en-US" dirty="0"/>
-              <a:t> (w = 0)</a:t>
-            </a:r>
-          </a:p>
-          <a:p>
-            <a:pPr>
-              <a:buFont typeface="Wingdings" panose="05000000000000000000" pitchFamily="2" charset="2"/>
-              <a:buChar char="§"/>
-            </a:pPr>
-            <a:r>
-              <a:rPr lang="en-US" dirty="0"/>
-              <a:t>De </a:t>
-            </a:r>
-            <a:r>
-              <a:rPr lang="en-US" dirty="0" err="1"/>
-              <a:t>az</a:t>
-            </a:r>
-            <a:r>
-              <a:rPr lang="en-US" dirty="0"/>
-              <a:t> </a:t>
-            </a:r>
-            <a:r>
-              <a:rPr lang="en-US" dirty="0" err="1"/>
-              <a:t>eredeti</a:t>
-            </a:r>
-            <a:r>
-              <a:rPr lang="en-US" dirty="0"/>
-              <a:t> </a:t>
-            </a:r>
-            <a:r>
-              <a:rPr lang="en-US" dirty="0" err="1"/>
-              <a:t>objektum</a:t>
-            </a:r>
-            <a:r>
-              <a:rPr lang="en-US" dirty="0"/>
-              <a:t> </a:t>
-            </a:r>
-            <a:r>
-              <a:rPr lang="en-US" dirty="0" err="1"/>
-              <a:t>és</a:t>
-            </a:r>
-            <a:r>
-              <a:rPr lang="en-US" dirty="0"/>
-              <a:t> a </a:t>
-            </a:r>
-            <a:r>
-              <a:rPr lang="en-US" i="1" dirty="0"/>
-              <a:t>2-manifold</a:t>
-            </a:r>
-            <a:r>
-              <a:rPr lang="en-US" dirty="0"/>
-              <a:t> </a:t>
-            </a:r>
-            <a:r>
-              <a:rPr lang="en-US" dirty="0" err="1"/>
-              <a:t>nem</a:t>
-            </a:r>
-            <a:r>
-              <a:rPr lang="en-US" dirty="0"/>
-              <a:t> </a:t>
-            </a:r>
-            <a:r>
-              <a:rPr lang="en-US" dirty="0" err="1"/>
-              <a:t>egyezik</a:t>
-            </a:r>
-            <a:r>
-              <a:rPr lang="en-US" dirty="0"/>
-              <a:t> meg, </a:t>
-            </a:r>
-            <a:r>
-              <a:rPr lang="en-US" dirty="0" err="1"/>
-              <a:t>ettől</a:t>
-            </a:r>
-            <a:r>
-              <a:rPr lang="en-US" dirty="0"/>
-              <a:t> a </a:t>
-            </a:r>
-            <a:r>
-              <a:rPr lang="en-US" i="1" dirty="0"/>
-              <a:t>front cap</a:t>
-            </a:r>
-            <a:r>
-              <a:rPr lang="en-US" dirty="0"/>
-              <a:t> </a:t>
-            </a:r>
-            <a:r>
-              <a:rPr lang="en-US" i="1" dirty="0" err="1"/>
-              <a:t>zfight</a:t>
-            </a:r>
-            <a:r>
-              <a:rPr lang="en-US" dirty="0" err="1"/>
-              <a:t>-olni</a:t>
-            </a:r>
-            <a:r>
-              <a:rPr lang="en-US" dirty="0"/>
-              <a:t> fog</a:t>
-            </a:r>
-          </a:p>
-          <a:p>
-            <a:pPr>
-              <a:buFont typeface="Wingdings" panose="05000000000000000000" pitchFamily="2" charset="2"/>
-              <a:buChar char="§"/>
-            </a:pPr>
-            <a:r>
-              <a:rPr lang="en-US" dirty="0"/>
-              <a:t>“</a:t>
-            </a:r>
-            <a:r>
-              <a:rPr lang="en-US" dirty="0" err="1"/>
-              <a:t>Megoldás</a:t>
-            </a:r>
-            <a:r>
-              <a:rPr lang="en-US" dirty="0"/>
-              <a:t>” (</a:t>
-            </a:r>
-            <a:r>
-              <a:rPr lang="en-US" dirty="0" err="1"/>
-              <a:t>csalás</a:t>
-            </a:r>
-            <a:r>
-              <a:rPr lang="en-US" dirty="0"/>
-              <a:t>): </a:t>
-            </a:r>
-            <a:r>
-              <a:rPr lang="en-US" dirty="0" err="1"/>
-              <a:t>vedd</a:t>
-            </a:r>
-            <a:r>
-              <a:rPr lang="en-US" dirty="0"/>
-              <a:t> </a:t>
-            </a:r>
-            <a:r>
-              <a:rPr lang="en-US" dirty="0" err="1"/>
-              <a:t>kisebbre</a:t>
-            </a:r>
-            <a:r>
-              <a:rPr lang="en-US" dirty="0"/>
-              <a:t> mint </a:t>
-            </a:r>
-            <a:r>
-              <a:rPr lang="en-US" dirty="0" err="1"/>
-              <a:t>az</a:t>
-            </a:r>
-            <a:r>
-              <a:rPr lang="en-US" dirty="0"/>
-              <a:t> </a:t>
-            </a:r>
-            <a:r>
-              <a:rPr lang="en-US" dirty="0" err="1"/>
-              <a:t>eredeti</a:t>
-            </a:r>
-            <a:r>
-              <a:rPr lang="en-US" dirty="0"/>
-              <a:t> </a:t>
-            </a:r>
-            <a:r>
-              <a:rPr lang="en-US" dirty="0" err="1"/>
-              <a:t>objektum</a:t>
-            </a:r>
-            <a:endParaRPr lang="en-US" dirty="0"/>
-          </a:p>
-          <a:p>
-            <a:pPr>
-              <a:buFont typeface="Wingdings" panose="05000000000000000000" pitchFamily="2" charset="2"/>
-              <a:buChar char="§"/>
-            </a:pPr>
-            <a:r>
-              <a:rPr lang="en-US" dirty="0"/>
-              <a:t>A </a:t>
-            </a:r>
-            <a:r>
-              <a:rPr lang="en-US" i="1" dirty="0"/>
-              <a:t>back cap</a:t>
-            </a:r>
-            <a:r>
-              <a:rPr lang="en-US" dirty="0"/>
-              <a:t> is </a:t>
-            </a:r>
-            <a:r>
-              <a:rPr lang="en-US" i="1" dirty="0" err="1"/>
-              <a:t>zfight</a:t>
-            </a:r>
-            <a:r>
-              <a:rPr lang="en-US" dirty="0" err="1"/>
-              <a:t>-olhat</a:t>
-            </a:r>
-            <a:r>
-              <a:rPr lang="en-US" dirty="0"/>
-              <a:t>, de </a:t>
-            </a:r>
-            <a:r>
-              <a:rPr lang="en-US" dirty="0" err="1"/>
-              <a:t>erre</a:t>
-            </a:r>
-            <a:r>
-              <a:rPr lang="en-US" dirty="0"/>
-              <a:t> </a:t>
-            </a:r>
-            <a:r>
-              <a:rPr lang="en-US" dirty="0" err="1"/>
-              <a:t>ott</a:t>
-            </a:r>
-            <a:r>
-              <a:rPr lang="en-US" dirty="0"/>
-              <a:t> van </a:t>
-            </a:r>
-            <a:r>
-              <a:rPr lang="en-US" dirty="0">
-                <a:latin typeface="Consolas" panose="020B0609020204030204" pitchFamily="49" charset="0"/>
-              </a:rPr>
-              <a:t>GL_DEPTH_CLAMP</a:t>
-            </a:r>
-            <a:r>
-              <a:rPr lang="en-US" dirty="0"/>
-              <a:t> (</a:t>
-            </a:r>
-            <a:r>
-              <a:rPr lang="en-US" dirty="0" err="1"/>
-              <a:t>kikapcsolja</a:t>
-            </a:r>
-            <a:r>
-              <a:rPr lang="en-US" dirty="0"/>
-              <a:t> a </a:t>
-            </a:r>
-            <a:r>
-              <a:rPr lang="en-US" i="1" dirty="0"/>
-              <a:t>clipping</a:t>
-            </a:r>
-            <a:r>
-              <a:rPr lang="en-US" dirty="0"/>
-              <a:t>-et)</a:t>
-            </a:r>
-          </a:p>
-          <a:p>
-            <a:pPr>
-              <a:buFont typeface="Wingdings" panose="05000000000000000000" pitchFamily="2" charset="2"/>
-              <a:buChar char="§"/>
-            </a:pPr>
-            <a:endParaRPr lang="en-US" dirty="0"/>
-          </a:p>
-          <a:p>
-            <a:pPr>
-              <a:buFont typeface="Wingdings" panose="05000000000000000000" pitchFamily="2" charset="2"/>
-              <a:buChar char="§"/>
-            </a:pPr>
-            <a:r>
-              <a:rPr lang="en-US" dirty="0"/>
-              <a:t>A </a:t>
-            </a:r>
-            <a:r>
-              <a:rPr lang="en-US" dirty="0" err="1"/>
-              <a:t>palást</a:t>
-            </a:r>
-            <a:r>
-              <a:rPr lang="en-US" dirty="0"/>
-              <a:t> </a:t>
-            </a:r>
-            <a:r>
-              <a:rPr lang="en-US" dirty="0" err="1"/>
-              <a:t>hasonlóan</a:t>
-            </a:r>
-            <a:r>
-              <a:rPr lang="en-US" dirty="0"/>
-              <a:t> </a:t>
-            </a:r>
-            <a:r>
-              <a:rPr lang="en-US" dirty="0" err="1"/>
-              <a:t>áll</a:t>
-            </a:r>
-            <a:r>
-              <a:rPr lang="en-US" dirty="0"/>
-              <a:t> </a:t>
-            </a:r>
-            <a:r>
-              <a:rPr lang="en-US" dirty="0" err="1"/>
-              <a:t>elő</a:t>
-            </a:r>
-            <a:r>
-              <a:rPr lang="en-US" dirty="0"/>
-              <a:t> a </a:t>
-            </a:r>
-            <a:r>
-              <a:rPr lang="en-US" dirty="0" err="1"/>
-              <a:t>sziluettből</a:t>
-            </a:r>
-            <a:r>
-              <a:rPr lang="en-US" dirty="0"/>
-              <a:t>: </a:t>
-            </a:r>
-            <a:r>
-              <a:rPr lang="en-US" dirty="0" err="1"/>
-              <a:t>élvertexek</a:t>
-            </a:r>
-            <a:r>
-              <a:rPr lang="en-US" dirty="0"/>
-              <a:t> + </a:t>
-            </a:r>
-            <a:r>
-              <a:rPr lang="en-US" dirty="0" err="1"/>
-              <a:t>ezek</a:t>
-            </a:r>
-            <a:r>
-              <a:rPr lang="en-US" dirty="0"/>
-              <a:t> </a:t>
-            </a:r>
-            <a:r>
-              <a:rPr lang="en-US" dirty="0" err="1"/>
-              <a:t>kivetítve</a:t>
-            </a:r>
-            <a:r>
-              <a:rPr lang="en-US" dirty="0"/>
-              <a:t> a </a:t>
-            </a:r>
-            <a:r>
-              <a:rPr lang="en-US" dirty="0" err="1"/>
-              <a:t>fényirány</a:t>
-            </a:r>
-            <a:r>
-              <a:rPr lang="en-US" dirty="0"/>
-              <a:t> </a:t>
-            </a:r>
-            <a:r>
-              <a:rPr lang="en-US" dirty="0" err="1"/>
-              <a:t>mentén</a:t>
-            </a:r>
-            <a:endParaRPr lang="en-US" dirty="0"/>
-          </a:p>
-          <a:p>
-            <a:pPr>
-              <a:buFont typeface="Wingdings" panose="05000000000000000000" pitchFamily="2" charset="2"/>
-              <a:buChar char="§"/>
-            </a:pPr>
-            <a:r>
-              <a:rPr lang="en-US" dirty="0" err="1"/>
-              <a:t>Egyéb</a:t>
-            </a:r>
-            <a:r>
-              <a:rPr lang="en-US" dirty="0"/>
-              <a:t> </a:t>
-            </a:r>
-            <a:r>
-              <a:rPr lang="en-US" dirty="0" err="1"/>
-              <a:t>ötletekhez</a:t>
-            </a:r>
-            <a:r>
-              <a:rPr lang="en-US" dirty="0"/>
-              <a:t>, </a:t>
-            </a:r>
-            <a:r>
-              <a:rPr lang="en-US" dirty="0" err="1"/>
-              <a:t>optimalizációkhoz</a:t>
-            </a:r>
-            <a:r>
-              <a:rPr lang="en-US" dirty="0"/>
-              <a:t> ld. </a:t>
-            </a:r>
-            <a:r>
-              <a:rPr lang="en-US" dirty="0" err="1">
-                <a:hlinkClick r:id="rId2"/>
-              </a:rPr>
-              <a:t>Gamasutra</a:t>
-            </a:r>
-            <a:endParaRPr lang="hu-HU" dirty="0"/>
-          </a:p>
-        </p:txBody>
-      </p:sp>
-    </p:spTree>
-    <p:extLst>
-      <p:ext uri="{BB962C8B-B14F-4D97-AF65-F5344CB8AC3E}">
-        <p14:creationId xmlns:p14="http://schemas.microsoft.com/office/powerpoint/2010/main" val="2771125297"/>
-      </p:ext>
-    </p:extLst>
-  </p:cSld>
-  <p:clrMapOvr>
-    <a:masterClrMapping/>
-  </p:clrMapOvr>
-</p:sld>
-</file>
-
 <file path=ppt/slides/slide7.xml><?xml version="1.0" encoding="utf-8"?>
 <p:sld xmlns:a="http://schemas.openxmlformats.org/drawingml/2006/main" xmlns:r="http://schemas.openxmlformats.org/officeDocument/2006/relationships" xmlns:p="http://schemas.openxmlformats.org/presentationml/2006/main">
   <p:cSld>
@@ -7389,8 +8239,20 @@
           <a:lstStyle/>
           <a:p>
             <a:r>
-              <a:rPr lang="en-US" dirty="0" err="1"/>
-              <a:t>Rajzolás</a:t>
+              <a:rPr lang="en-US" dirty="0"/>
+              <a:t>A </a:t>
+            </a:r>
+            <a:r>
+              <a:rPr lang="en-US" dirty="0" err="1"/>
+              <a:t>rajzolás</a:t>
+            </a:r>
+            <a:r>
+              <a:rPr lang="en-US" dirty="0"/>
+              <a:t> </a:t>
+            </a:r>
+            <a:r>
+              <a:rPr lang="en-US" dirty="0" err="1"/>
+              <a:t>menete</a:t>
             </a:r>
             <a:endParaRPr lang="hu-HU" dirty="0"/>
           </a:p>
@@ -7423,7 +8285,7 @@
             </a:pPr>
             <a:r>
               <a:rPr lang="en-US" dirty="0" err="1"/>
-              <a:t>Legelső</a:t>
+              <a:t>Nulladik</a:t>
             </a:r>
             <a:r>
               <a:rPr lang="en-US" dirty="0"/>
@@ -7443,29 +8305,40 @@
             </a:r>
             <a:r>
               <a:rPr lang="en-US" dirty="0"/>
-              <a:t>, a </a:t>
-            </a:r>
-            <a:r>
-              <a:rPr lang="en-US" dirty="0" err="1"/>
-              <a:t>képet</a:t>
-            </a:r>
-            <a:r>
-              <a:rPr lang="en-US" dirty="0"/>
-              <a:t> </a:t>
-            </a:r>
-            <a:r>
-              <a:rPr lang="en-US" dirty="0" err="1"/>
-              <a:t>letörlöd</a:t>
-            </a:r>
-            <a:r>
-              <a:rPr lang="en-US" dirty="0"/>
-              <a:t> </a:t>
-            </a:r>
-            <a:r>
-              <a:rPr lang="en-US" dirty="0" err="1"/>
-              <a:t>feketével</a:t>
-            </a:r>
-            <a:endParaRPr lang="en-US" dirty="0"/>
+              <a:t>, </a:t>
+            </a:r>
+            <a:r>
+              <a:rPr lang="en-US" dirty="0" err="1"/>
+              <a:t>elkerülendő</a:t>
+            </a:r>
+            <a:r>
+              <a:rPr lang="en-US" dirty="0"/>
+              <a:t> a </a:t>
+            </a:r>
+            <a:r>
+              <a:rPr lang="en-US" dirty="0" err="1"/>
+              <a:t>fölösleges</a:t>
+            </a:r>
+            <a:r>
+              <a:rPr lang="en-US" dirty="0"/>
+              <a:t> </a:t>
+            </a:r>
+            <a:r>
+              <a:rPr lang="en-US" i="1" dirty="0"/>
+              <a:t>overdraw</a:t>
+            </a:r>
+            <a:r>
+              <a:rPr lang="en-US" dirty="0"/>
+              <a:t>-</a:t>
+            </a:r>
+            <a:r>
+              <a:rPr lang="en-US" dirty="0" err="1"/>
+              <a:t>okat</a:t>
+            </a:r>
+            <a:r>
+              <a:rPr lang="en-US" dirty="0"/>
+              <a:t>.</a:t>
+            </a:r>
           </a:p>
           <a:p>
             <a:pPr>
@@ -7474,7 +8347,7 @@
             </a:pPr>
             <a:r>
               <a:rPr lang="en-US" i="1" dirty="0"/>
-              <a:t>Z-write</a:t>
+              <a:t>z-write</a:t>
             </a:r>
             <a:r>
               <a:rPr lang="en-US" dirty="0"/>
@@ -7703,7 +8576,31 @@
             </a:r>
             <a:r>
               <a:rPr lang="en-US" dirty="0"/>
-              <a:t>-gel</a:t>
+              <a:t>-gel (a </a:t>
+            </a:r>
+            <a:r>
+              <a:rPr lang="en-US" dirty="0" err="1"/>
+              <a:t>feladatban</a:t>
+            </a:r>
+            <a:r>
+              <a:rPr lang="en-US" dirty="0"/>
+              <a:t> </a:t>
+            </a:r>
+            <a:r>
+              <a:rPr lang="en-US" dirty="0" err="1"/>
+              <a:t>két</a:t>
+            </a:r>
+            <a:r>
+              <a:rPr lang="en-US" dirty="0"/>
+              <a:t> </a:t>
+            </a:r>
+            <a:r>
+              <a:rPr lang="en-US" dirty="0" err="1"/>
+              <a:t>fényforrás</a:t>
+            </a:r>
+            <a:r>
+              <a:rPr lang="en-US" dirty="0"/>
+              <a:t> van!)</a:t>
             </a:r>
           </a:p>
           <a:p>
@@ -7840,81 +8737,55 @@
             </a:r>
             <a:r>
               <a:rPr lang="en-US" dirty="0"/>
-              <a:t>)</a:t>
-            </a:r>
-          </a:p>
-          <a:p>
-            <a:pPr>
-              <a:buFont typeface="Wingdings" panose="05000000000000000000" pitchFamily="2" charset="2"/>
-              <a:buChar char="§"/>
-            </a:pPr>
-            <a:r>
-              <a:rPr lang="en-US" dirty="0"/>
-              <a:t>Ld. </a:t>
-            </a:r>
-            <a:r>
-              <a:rPr lang="en-US" i="1" dirty="0"/>
-              <a:t>Jedi Outcast </a:t>
-            </a:r>
-            <a:r>
-              <a:rPr lang="en-US" dirty="0"/>
-              <a:t>(</a:t>
-            </a:r>
-            <a:r>
-              <a:rPr lang="en-US" dirty="0" err="1"/>
-              <a:t>nem</a:t>
-            </a:r>
-            <a:r>
-              <a:rPr lang="en-US" dirty="0"/>
-              <a:t> </a:t>
-            </a:r>
-            <a:r>
-              <a:rPr lang="en-US" dirty="0" err="1"/>
-              <a:t>tudom</a:t>
-            </a:r>
-            <a:r>
-              <a:rPr lang="en-US" dirty="0"/>
-              <a:t> </a:t>
-            </a:r>
-            <a:r>
-              <a:rPr lang="en-US" dirty="0" err="1"/>
-              <a:t>megerősíteni</a:t>
-            </a:r>
-            <a:r>
-              <a:rPr lang="en-US" dirty="0"/>
-              <a:t>, </a:t>
-            </a:r>
-            <a:r>
-              <a:rPr lang="en-US" dirty="0" err="1"/>
-              <a:t>csak</a:t>
-            </a:r>
-            <a:r>
-              <a:rPr lang="en-US" dirty="0"/>
-              <a:t> </a:t>
-            </a:r>
-            <a:r>
-              <a:rPr lang="en-US" dirty="0" err="1"/>
-              <a:t>látom</a:t>
-            </a:r>
-            <a:r>
-              <a:rPr lang="en-US" dirty="0"/>
-              <a:t>, </a:t>
-            </a:r>
-            <a:r>
-              <a:rPr lang="en-US" dirty="0" err="1"/>
-              <a:t>hogy</a:t>
-            </a:r>
-            <a:r>
-              <a:rPr lang="en-US" dirty="0"/>
-              <a:t> </a:t>
-            </a:r>
-            <a:r>
-              <a:rPr lang="en-US" dirty="0" err="1"/>
-              <a:t>rossz</a:t>
-            </a:r>
-            <a:r>
-              <a:rPr lang="en-US" dirty="0"/>
-              <a:t>)</a:t>
+              <a:t>); </a:t>
+            </a:r>
+            <a:r>
+              <a:rPr lang="en-US" dirty="0" err="1"/>
+              <a:t>speciel</a:t>
+            </a:r>
+            <a:r>
+              <a:rPr lang="en-US" dirty="0"/>
+              <a:t> </a:t>
+            </a:r>
+            <a:r>
+              <a:rPr lang="en-US" dirty="0" err="1"/>
+              <a:t>az</a:t>
+            </a:r>
+            <a:r>
+              <a:rPr lang="en-US" dirty="0"/>
+              <a:t> </a:t>
+            </a:r>
+            <a:r>
+              <a:rPr lang="en-US" i="1" dirty="0" err="1"/>
+              <a:t>ArchiCAD</a:t>
+            </a:r>
+            <a:r>
+              <a:rPr lang="en-US" dirty="0"/>
+              <a:t> is </a:t>
+            </a:r>
+            <a:r>
+              <a:rPr lang="en-US" dirty="0" err="1"/>
+              <a:t>ezt</a:t>
+            </a:r>
+            <a:r>
+              <a:rPr lang="en-US" dirty="0"/>
+              <a:t> </a:t>
+            </a:r>
+            <a:r>
+              <a:rPr lang="en-US" dirty="0" err="1"/>
+              <a:t>csinálta</a:t>
+            </a:r>
+            <a:r>
+              <a:rPr lang="en-US" dirty="0"/>
+              <a:t> </a:t>
+            </a:r>
+            <a:r>
+              <a:rPr lang="en-US" dirty="0" err="1"/>
+              <a:t>annó</a:t>
+            </a:r>
+            <a:r>
+              <a:rPr lang="en-US" dirty="0"/>
+              <a:t>…</a:t>
             </a:r>
           </a:p>
           <a:p>
@@ -7930,6 +8801,472 @@
     <p:extLst>
       <p:ext uri="{BB962C8B-B14F-4D97-AF65-F5344CB8AC3E}">
         <p14:creationId xmlns:p14="http://schemas.microsoft.com/office/powerpoint/2010/main" val="793178633"/>
+      </p:ext>
+    </p:extLst>
+  </p:cSld>
+  <p:clrMapOvr>
+    <a:masterClrMapping/>
+  </p:clrMapOvr>
+</p:sld>
+</file>
+
+<file path=ppt/slides/slide8.xml><?xml version="1.0" encoding="utf-8"?>
+<p:sld xmlns:a="http://schemas.openxmlformats.org/drawingml/2006/main" xmlns:r="http://schemas.openxmlformats.org/officeDocument/2006/relationships" xmlns:p="http://schemas.openxmlformats.org/presentationml/2006/main">
+  <p:cSld>
+    <p:spTree>
+      <p:nvGrpSpPr>
+        <p:cNvPr id="1" name=""/>
+        <p:cNvGrpSpPr/>
+        <p:nvPr/>
+      </p:nvGrpSpPr>
+      <p:grpSpPr>
+        <a:xfrm>
+          <a:off x="0" y="0"/>
+          <a:ext cx="0" cy="0"/>
+          <a:chOff x="0" y="0"/>
+          <a:chExt cx="0" cy="0"/>
+        </a:xfrm>
+      </p:grpSpPr>
+      <p:sp>
+        <p:nvSpPr>
+          <p:cNvPr id="2" name="Title 1">
+            <a:extLst>
+              <a:ext uri="{FF2B5EF4-FFF2-40B4-BE49-F238E27FC236}">
+                <a16:creationId xmlns:a16="http://schemas.microsoft.com/office/drawing/2014/main" id="{0AC9BCE9-77B4-43E2-A2EA-77A181F28DE9}"/>
+              </a:ext>
+            </a:extLst>
+          </p:cNvPr>
+          <p:cNvSpPr>
+            <a:spLocks noGrp="1"/>
+          </p:cNvSpPr>
+          <p:nvPr>
+            <p:ph type="title"/>
+          </p:nvPr>
+        </p:nvSpPr>
+        <p:spPr/>
+        <p:txBody>
+          <a:bodyPr/>
+          <a:lstStyle/>
+          <a:p>
+            <a:r>
+              <a:rPr lang="en-US" dirty="0" err="1"/>
+              <a:t>Példa</a:t>
+            </a:r>
+            <a:r>
+              <a:rPr lang="en-US" dirty="0"/>
+              <a:t>: </a:t>
+            </a:r>
+            <a:r>
+              <a:rPr lang="en-US" dirty="0" err="1"/>
+              <a:t>hibás</a:t>
+            </a:r>
+            <a:r>
+              <a:rPr lang="en-US" dirty="0"/>
+              <a:t> </a:t>
+            </a:r>
+            <a:r>
+              <a:rPr lang="en-US" dirty="0" err="1"/>
+              <a:t>önárnyék</a:t>
+            </a:r>
+            <a:r>
+              <a:rPr lang="en-US" dirty="0"/>
+              <a:t> (Jedi Outcast)</a:t>
+            </a:r>
+            <a:endParaRPr lang="hu-HU" dirty="0"/>
+          </a:p>
+        </p:txBody>
+      </p:sp>
+      <p:sp>
+        <p:nvSpPr>
+          <p:cNvPr id="9" name="Content Placeholder 8">
+            <a:extLst>
+              <a:ext uri="{FF2B5EF4-FFF2-40B4-BE49-F238E27FC236}">
+                <a16:creationId xmlns:a16="http://schemas.microsoft.com/office/drawing/2014/main" id="{AD125E0C-C1AC-4503-B8D9-584BE32029AD}"/>
+              </a:ext>
+            </a:extLst>
+          </p:cNvPr>
+          <p:cNvSpPr>
+            <a:spLocks noGrp="1"/>
+          </p:cNvSpPr>
+          <p:nvPr>
+            <p:ph idx="1"/>
+          </p:nvPr>
+        </p:nvSpPr>
+        <p:spPr/>
+        <p:txBody>
+          <a:bodyPr/>
+          <a:lstStyle/>
+          <a:p>
+            <a:pPr>
+              <a:buFont typeface="Wingdings" panose="05000000000000000000" pitchFamily="2" charset="2"/>
+              <a:buChar char="§"/>
+            </a:pPr>
+            <a:r>
+              <a:rPr lang="en-US" dirty="0" err="1"/>
+              <a:t>Vagy</a:t>
+            </a:r>
+            <a:r>
+              <a:rPr lang="en-US" dirty="0"/>
+              <a:t> </a:t>
+            </a:r>
+            <a:r>
+              <a:rPr lang="en-US" dirty="0" err="1"/>
+              <a:t>az</a:t>
+            </a:r>
+            <a:r>
+              <a:rPr lang="en-US" dirty="0"/>
+              <a:t> </a:t>
+            </a:r>
+            <a:r>
+              <a:rPr lang="en-US" dirty="0" err="1"/>
+              <a:t>említett</a:t>
+            </a:r>
+            <a:r>
+              <a:rPr lang="en-US" dirty="0"/>
+              <a:t> </a:t>
+            </a:r>
+            <a:r>
+              <a:rPr lang="en-US" i="1" dirty="0" err="1"/>
+              <a:t>fullscreen</a:t>
+            </a:r>
+            <a:r>
+              <a:rPr lang="en-US" i="1" dirty="0"/>
+              <a:t> quad</a:t>
+            </a:r>
+            <a:r>
+              <a:rPr lang="en-US" dirty="0"/>
+              <a:t>, </a:t>
+            </a:r>
+            <a:r>
+              <a:rPr lang="en-US" dirty="0" err="1"/>
+              <a:t>vagy</a:t>
+            </a:r>
+            <a:r>
+              <a:rPr lang="en-US" dirty="0"/>
+              <a:t> </a:t>
+            </a:r>
+            <a:r>
+              <a:rPr lang="en-US" dirty="0" err="1"/>
+              <a:t>rossz</a:t>
+            </a:r>
+            <a:r>
+              <a:rPr lang="en-US" dirty="0"/>
+              <a:t> </a:t>
+            </a:r>
+            <a:r>
+              <a:rPr lang="en-US" i="1" dirty="0"/>
+              <a:t>multi-pass lighting</a:t>
+            </a:r>
+            <a:r>
+              <a:rPr lang="en-US" dirty="0"/>
+              <a:t> </a:t>
+            </a:r>
+            <a:r>
+              <a:rPr lang="en-US" dirty="0" err="1"/>
+              <a:t>miatt</a:t>
+            </a:r>
+            <a:endParaRPr lang="en-US" dirty="0"/>
+          </a:p>
+          <a:p>
+            <a:pPr>
+              <a:buFont typeface="Wingdings" panose="05000000000000000000" pitchFamily="2" charset="2"/>
+              <a:buChar char="§"/>
+            </a:pPr>
+            <a:r>
+              <a:rPr lang="en-US" dirty="0" err="1"/>
+              <a:t>Sőt</a:t>
+            </a:r>
+            <a:r>
+              <a:rPr lang="en-US" dirty="0"/>
+              <a:t>, </a:t>
+            </a:r>
+            <a:r>
+              <a:rPr lang="en-US" dirty="0" err="1"/>
+              <a:t>mivel</a:t>
+            </a:r>
+            <a:r>
+              <a:rPr lang="en-US" dirty="0"/>
+              <a:t> </a:t>
+            </a:r>
+            <a:r>
+              <a:rPr lang="en-US" dirty="0" err="1"/>
+              <a:t>nem</a:t>
+            </a:r>
+            <a:r>
+              <a:rPr lang="en-US" dirty="0"/>
+              <a:t> </a:t>
+            </a:r>
+            <a:r>
+              <a:rPr lang="en-US" dirty="0" err="1"/>
+              <a:t>minden</a:t>
+            </a:r>
+            <a:r>
+              <a:rPr lang="en-US" dirty="0"/>
+              <a:t> vet </a:t>
+            </a:r>
+            <a:r>
+              <a:rPr lang="en-US" dirty="0" err="1"/>
+              <a:t>árnyékot</a:t>
+            </a:r>
+            <a:r>
+              <a:rPr lang="en-US" dirty="0"/>
+              <a:t>, </a:t>
+            </a:r>
+            <a:r>
+              <a:rPr lang="en-US" dirty="0" err="1"/>
+              <a:t>időnként</a:t>
+            </a:r>
+            <a:r>
+              <a:rPr lang="en-US" dirty="0"/>
+              <a:t> </a:t>
+            </a:r>
+            <a:r>
+              <a:rPr lang="en-US" dirty="0" err="1"/>
+              <a:t>megjelenik</a:t>
+            </a:r>
+            <a:r>
+              <a:rPr lang="en-US" dirty="0"/>
+              <a:t> a </a:t>
+            </a:r>
+            <a:r>
+              <a:rPr lang="en-US" dirty="0" err="1"/>
+              <a:t>plafonon</a:t>
+            </a:r>
+            <a:r>
+              <a:rPr lang="en-US" dirty="0"/>
+              <a:t> is</a:t>
+            </a:r>
+          </a:p>
+        </p:txBody>
+      </p:sp>
+      <p:pic>
+        <p:nvPicPr>
+          <p:cNvPr id="11" name="Picture 10">
+            <a:extLst>
+              <a:ext uri="{FF2B5EF4-FFF2-40B4-BE49-F238E27FC236}">
+                <a16:creationId xmlns:a16="http://schemas.microsoft.com/office/drawing/2014/main" id="{C67996CC-7AA0-4151-83B9-BEFB808DB7E9}"/>
+              </a:ext>
+            </a:extLst>
+          </p:cNvPr>
+          <p:cNvPicPr>
+            <a:picLocks noChangeAspect="1"/>
+          </p:cNvPicPr>
+          <p:nvPr/>
+        </p:nvPicPr>
+        <p:blipFill>
+          <a:blip r:embed="rId2">
+            <a:extLst>
+              <a:ext uri="{28A0092B-C50C-407E-A947-70E740481C1C}">
+                <a14:useLocalDpi xmlns:a14="http://schemas.microsoft.com/office/drawing/2010/main" val="0"/>
+              </a:ext>
+            </a:extLst>
+          </a:blip>
+          <a:stretch>
+            <a:fillRect/>
+          </a:stretch>
+        </p:blipFill>
+        <p:spPr>
+          <a:xfrm>
+            <a:off x="2575560" y="2680888"/>
+            <a:ext cx="6797449" cy="3498435"/>
+          </a:xfrm>
+          <a:prstGeom prst="rect">
+            <a:avLst/>
+          </a:prstGeom>
+        </p:spPr>
+      </p:pic>
+    </p:spTree>
+    <p:extLst>
+      <p:ext uri="{BB962C8B-B14F-4D97-AF65-F5344CB8AC3E}">
+        <p14:creationId xmlns:p14="http://schemas.microsoft.com/office/powerpoint/2010/main" val="1165723881"/>
+      </p:ext>
+    </p:extLst>
+  </p:cSld>
+  <p:clrMapOvr>
+    <a:masterClrMapping/>
+  </p:clrMapOvr>
+</p:sld>
+</file>
+
+<file path=ppt/slides/slide9.xml><?xml version="1.0" encoding="utf-8"?>
+<p:sld xmlns:a="http://schemas.openxmlformats.org/drawingml/2006/main" xmlns:r="http://schemas.openxmlformats.org/officeDocument/2006/relationships" xmlns:p="http://schemas.openxmlformats.org/presentationml/2006/main">
+  <p:cSld>
+    <p:spTree>
+      <p:nvGrpSpPr>
+        <p:cNvPr id="1" name=""/>
+        <p:cNvGrpSpPr/>
+        <p:nvPr/>
+      </p:nvGrpSpPr>
+      <p:grpSpPr>
+        <a:xfrm>
+          <a:off x="0" y="0"/>
+          <a:ext cx="0" cy="0"/>
+          <a:chOff x="0" y="0"/>
+          <a:chExt cx="0" cy="0"/>
+        </a:xfrm>
+      </p:grpSpPr>
+      <p:sp>
+        <p:nvSpPr>
+          <p:cNvPr id="2" name="Title 1">
+            <a:extLst>
+              <a:ext uri="{FF2B5EF4-FFF2-40B4-BE49-F238E27FC236}">
+                <a16:creationId xmlns:a16="http://schemas.microsoft.com/office/drawing/2014/main" id="{638D1B3C-28A9-4679-B720-6BBAA9E4AFE5}"/>
+              </a:ext>
+            </a:extLst>
+          </p:cNvPr>
+          <p:cNvSpPr>
+            <a:spLocks noGrp="1"/>
+          </p:cNvSpPr>
+          <p:nvPr>
+            <p:ph type="title"/>
+          </p:nvPr>
+        </p:nvSpPr>
+        <p:spPr/>
+        <p:txBody>
+          <a:bodyPr/>
+          <a:lstStyle/>
+          <a:p>
+            <a:r>
+              <a:rPr lang="en-US" dirty="0" err="1"/>
+              <a:t>Példa</a:t>
+            </a:r>
+            <a:r>
+              <a:rPr lang="en-US" dirty="0"/>
+              <a:t>: </a:t>
+            </a:r>
+            <a:r>
+              <a:rPr lang="en-US" dirty="0" err="1"/>
+              <a:t>helyes</a:t>
+            </a:r>
+            <a:r>
+              <a:rPr lang="en-US" dirty="0"/>
+              <a:t> </a:t>
+            </a:r>
+            <a:r>
+              <a:rPr lang="en-US" dirty="0" err="1"/>
+              <a:t>önárnyék</a:t>
+            </a:r>
+            <a:r>
+              <a:rPr lang="en-US" dirty="0"/>
+              <a:t> (Doom 3 BFG)</a:t>
+            </a:r>
+            <a:endParaRPr lang="hu-HU" dirty="0"/>
+          </a:p>
+        </p:txBody>
+      </p:sp>
+      <p:sp>
+        <p:nvSpPr>
+          <p:cNvPr id="3" name="Content Placeholder 2">
+            <a:extLst>
+              <a:ext uri="{FF2B5EF4-FFF2-40B4-BE49-F238E27FC236}">
+                <a16:creationId xmlns:a16="http://schemas.microsoft.com/office/drawing/2014/main" id="{3E04927D-4D5A-4FA0-AAC1-F438FDF5E6D9}"/>
+              </a:ext>
+            </a:extLst>
+          </p:cNvPr>
+          <p:cNvSpPr>
+            <a:spLocks noGrp="1"/>
+          </p:cNvSpPr>
+          <p:nvPr>
+            <p:ph idx="1"/>
+          </p:nvPr>
+        </p:nvSpPr>
+        <p:spPr/>
+        <p:txBody>
+          <a:bodyPr/>
+          <a:lstStyle/>
+          <a:p>
+            <a:pPr>
+              <a:buFont typeface="Wingdings" panose="05000000000000000000" pitchFamily="2" charset="2"/>
+              <a:buChar char="§"/>
+            </a:pPr>
+            <a:r>
+              <a:rPr lang="en-US" dirty="0" err="1"/>
+              <a:t>Az</a:t>
+            </a:r>
+            <a:r>
+              <a:rPr lang="en-US" dirty="0"/>
+              <a:t> </a:t>
+            </a:r>
+            <a:r>
+              <a:rPr lang="en-US" dirty="0" err="1"/>
+              <a:t>eredeti</a:t>
+            </a:r>
+            <a:r>
+              <a:rPr lang="en-US" dirty="0"/>
+              <a:t> </a:t>
+            </a:r>
+            <a:r>
+              <a:rPr lang="en-US" i="1" dirty="0"/>
+              <a:t>Doom 3</a:t>
+            </a:r>
+            <a:r>
+              <a:rPr lang="en-US" dirty="0"/>
+              <a:t>-ban </a:t>
+            </a:r>
+            <a:r>
+              <a:rPr lang="en-US" dirty="0" err="1"/>
+              <a:t>valamiért</a:t>
+            </a:r>
+            <a:r>
+              <a:rPr lang="en-US" dirty="0"/>
+              <a:t> </a:t>
+            </a:r>
+            <a:r>
+              <a:rPr lang="en-US" dirty="0" err="1"/>
+              <a:t>ki</a:t>
+            </a:r>
+            <a:r>
+              <a:rPr lang="en-US" dirty="0"/>
+              <a:t> volt </a:t>
+            </a:r>
+            <a:r>
+              <a:rPr lang="en-US" dirty="0" err="1"/>
+              <a:t>kapcsolva</a:t>
+            </a:r>
+            <a:endParaRPr lang="en-US" dirty="0"/>
+          </a:p>
+        </p:txBody>
+      </p:sp>
+      <p:pic>
+        <p:nvPicPr>
+          <p:cNvPr id="5" name="Picture 4">
+            <a:extLst>
+              <a:ext uri="{FF2B5EF4-FFF2-40B4-BE49-F238E27FC236}">
+                <a16:creationId xmlns:a16="http://schemas.microsoft.com/office/drawing/2014/main" id="{910719B2-7271-4931-AE1C-1EDE8EBCC79C}"/>
+              </a:ext>
+            </a:extLst>
+          </p:cNvPr>
+          <p:cNvPicPr>
+            <a:picLocks noChangeAspect="1"/>
+          </p:cNvPicPr>
+          <p:nvPr/>
+        </p:nvPicPr>
+        <p:blipFill>
+          <a:blip r:embed="rId2">
+            <a:extLst>
+              <a:ext uri="{28A0092B-C50C-407E-A947-70E740481C1C}">
+                <a14:useLocalDpi xmlns:a14="http://schemas.microsoft.com/office/drawing/2010/main" val="0"/>
+              </a:ext>
+            </a:extLst>
+          </a:blip>
+          <a:stretch>
+            <a:fillRect/>
+          </a:stretch>
+        </p:blipFill>
+        <p:spPr>
+          <a:xfrm>
+            <a:off x="2676144" y="2313772"/>
+            <a:ext cx="6836229" cy="3845379"/>
+          </a:xfrm>
+          <a:prstGeom prst="rect">
+            <a:avLst/>
+          </a:prstGeom>
+        </p:spPr>
+      </p:pic>
+    </p:spTree>
+    <p:extLst>
+      <p:ext uri="{BB962C8B-B14F-4D97-AF65-F5344CB8AC3E}">
+        <p14:creationId xmlns:p14="http://schemas.microsoft.com/office/powerpoint/2010/main" val="1625500521"/>
       </p:ext>
     </p:extLst>
   </p:cSld>

</xml_diff>

<commit_message>
shadow volume prez 3
</commit_message>
<xml_diff>
--- a/GFX_EA_01.pptx
+++ b/GFX_EA_01.pptx
@@ -5,7 +5,7 @@
     <p:sldMasterId id="2147483767" r:id="rId1"/>
   </p:sldMasterIdLst>
   <p:notesMasterIdLst>
-    <p:notesMasterId r:id="rId12"/>
+    <p:notesMasterId r:id="rId13"/>
   </p:notesMasterIdLst>
   <p:sldIdLst>
     <p:sldId id="256" r:id="rId2"/>
@@ -17,7 +17,8 @@
     <p:sldId id="262" r:id="rId8"/>
     <p:sldId id="264" r:id="rId9"/>
     <p:sldId id="265" r:id="rId10"/>
-    <p:sldId id="263" r:id="rId11"/>
+    <p:sldId id="266" r:id="rId11"/>
+    <p:sldId id="263" r:id="rId12"/>
   </p:sldIdLst>
   <p:sldSz cx="12192000" cy="6858000"/>
   <p:notesSz cx="7104063" cy="10234613"/>
@@ -552,7 +553,15 @@
             </a:r>
             <a:r>
               <a:rPr lang="en-US" dirty="0" err="1"/>
-              <a:t>jelenetet</a:t>
+              <a:t>jelenet</a:t>
+            </a:r>
+            <a:r>
+              <a:rPr lang="en-US" dirty="0"/>
+              <a:t> </a:t>
+            </a:r>
+            <a:r>
+              <a:rPr lang="en-US" dirty="0" err="1"/>
+              <a:t>kirajzolását</a:t>
             </a:r>
             <a:r>
               <a:rPr lang="en-US" dirty="0"/>
@@ -4409,6 +4418,619 @@
 <file path=ppt/slides/slide10.xml><?xml version="1.0" encoding="utf-8"?>
 <p:sld xmlns:a="http://schemas.openxmlformats.org/drawingml/2006/main" xmlns:r="http://schemas.openxmlformats.org/officeDocument/2006/relationships" xmlns:p="http://schemas.openxmlformats.org/presentationml/2006/main">
   <p:cSld>
+    <p:spTree>
+      <p:nvGrpSpPr>
+        <p:cNvPr id="1" name=""/>
+        <p:cNvGrpSpPr/>
+        <p:nvPr/>
+      </p:nvGrpSpPr>
+      <p:grpSpPr>
+        <a:xfrm>
+          <a:off x="0" y="0"/>
+          <a:ext cx="0" cy="0"/>
+          <a:chOff x="0" y="0"/>
+          <a:chExt cx="0" cy="0"/>
+        </a:xfrm>
+      </p:grpSpPr>
+      <p:sp>
+        <p:nvSpPr>
+          <p:cNvPr id="2" name="Title 1">
+            <a:extLst>
+              <a:ext uri="{FF2B5EF4-FFF2-40B4-BE49-F238E27FC236}">
+                <a16:creationId xmlns:a16="http://schemas.microsoft.com/office/drawing/2014/main" id="{7526A8DE-1316-40DC-9B44-A4836F653751}"/>
+              </a:ext>
+            </a:extLst>
+          </p:cNvPr>
+          <p:cNvSpPr>
+            <a:spLocks noGrp="1"/>
+          </p:cNvSpPr>
+          <p:nvPr>
+            <p:ph type="title"/>
+          </p:nvPr>
+        </p:nvSpPr>
+        <p:spPr/>
+        <p:txBody>
+          <a:bodyPr/>
+          <a:lstStyle/>
+          <a:p>
+            <a:r>
+              <a:rPr lang="en-US" dirty="0"/>
+              <a:t>Ha </a:t>
+            </a:r>
+            <a:r>
+              <a:rPr lang="en-US" dirty="0" err="1"/>
+              <a:t>nem</a:t>
+            </a:r>
+            <a:r>
+              <a:rPr lang="en-US" dirty="0"/>
+              <a:t> </a:t>
+            </a:r>
+            <a:r>
+              <a:rPr lang="en-US" dirty="0" err="1"/>
+              <a:t>használsz</a:t>
+            </a:r>
+            <a:r>
+              <a:rPr lang="en-US" dirty="0"/>
+              <a:t> </a:t>
+            </a:r>
+            <a:r>
+              <a:rPr lang="en-US" i="1" dirty="0"/>
+              <a:t>2-manifold</a:t>
+            </a:r>
+            <a:r>
+              <a:rPr lang="en-US" dirty="0"/>
+              <a:t>-okat…</a:t>
+            </a:r>
+            <a:endParaRPr lang="hu-HU" dirty="0"/>
+          </a:p>
+        </p:txBody>
+      </p:sp>
+      <p:sp>
+        <p:nvSpPr>
+          <p:cNvPr id="3" name="Content Placeholder 2">
+            <a:extLst>
+              <a:ext uri="{FF2B5EF4-FFF2-40B4-BE49-F238E27FC236}">
+                <a16:creationId xmlns:a16="http://schemas.microsoft.com/office/drawing/2014/main" id="{DAA64DB4-54B3-44A9-9C70-1E1B62AE2FCC}"/>
+              </a:ext>
+            </a:extLst>
+          </p:cNvPr>
+          <p:cNvSpPr>
+            <a:spLocks noGrp="1"/>
+          </p:cNvSpPr>
+          <p:nvPr>
+            <p:ph idx="1"/>
+          </p:nvPr>
+        </p:nvSpPr>
+        <p:spPr/>
+        <p:txBody>
+          <a:bodyPr/>
+          <a:lstStyle/>
+          <a:p>
+            <a:pPr>
+              <a:buFont typeface="Wingdings" panose="05000000000000000000" pitchFamily="2" charset="2"/>
+              <a:buChar char="§"/>
+            </a:pPr>
+            <a:r>
+              <a:rPr lang="en-US" dirty="0"/>
+              <a:t>…</a:t>
+            </a:r>
+            <a:r>
+              <a:rPr lang="en-US" dirty="0" err="1"/>
+              <a:t>akkor</a:t>
+            </a:r>
+            <a:r>
+              <a:rPr lang="en-US" dirty="0"/>
+              <a:t> </a:t>
+            </a:r>
+            <a:r>
+              <a:rPr lang="en-US" dirty="0" err="1"/>
+              <a:t>az</a:t>
+            </a:r>
+            <a:r>
+              <a:rPr lang="en-US" dirty="0"/>
+              <a:t> </a:t>
+            </a:r>
+            <a:r>
+              <a:rPr lang="en-US" dirty="0" err="1"/>
+              <a:t>objektum</a:t>
+            </a:r>
+            <a:r>
+              <a:rPr lang="en-US" dirty="0"/>
+              <a:t> </a:t>
+            </a:r>
+            <a:r>
+              <a:rPr lang="en-US" dirty="0" err="1"/>
+              <a:t>összes</a:t>
+            </a:r>
+            <a:r>
+              <a:rPr lang="en-US" dirty="0"/>
+              <a:t> </a:t>
+            </a:r>
+            <a:r>
+              <a:rPr lang="en-US" dirty="0" err="1"/>
+              <a:t>háromszögét</a:t>
+            </a:r>
+            <a:r>
+              <a:rPr lang="en-US" dirty="0"/>
+              <a:t> </a:t>
+            </a:r>
+            <a:r>
+              <a:rPr lang="en-US" dirty="0" err="1"/>
+              <a:t>ki</a:t>
+            </a:r>
+            <a:r>
+              <a:rPr lang="en-US" dirty="0"/>
+              <a:t> </a:t>
+            </a:r>
+            <a:r>
+              <a:rPr lang="en-US" dirty="0" err="1"/>
+              <a:t>kell</a:t>
+            </a:r>
+            <a:r>
+              <a:rPr lang="en-US" dirty="0"/>
+              <a:t> </a:t>
+            </a:r>
+            <a:r>
+              <a:rPr lang="en-US" dirty="0" err="1"/>
+              <a:t>húzni</a:t>
+            </a:r>
+            <a:endParaRPr lang="en-US" dirty="0"/>
+          </a:p>
+          <a:p>
+            <a:pPr>
+              <a:buFont typeface="Wingdings" panose="05000000000000000000" pitchFamily="2" charset="2"/>
+              <a:buChar char="§"/>
+            </a:pPr>
+            <a:r>
+              <a:rPr lang="en-US" dirty="0" err="1"/>
+              <a:t>Poligonszámtól</a:t>
+            </a:r>
+            <a:r>
+              <a:rPr lang="en-US" dirty="0"/>
+              <a:t> </a:t>
+            </a:r>
+            <a:r>
+              <a:rPr lang="en-US" dirty="0" err="1"/>
+              <a:t>függően</a:t>
+            </a:r>
+            <a:r>
+              <a:rPr lang="en-US" dirty="0"/>
+              <a:t> </a:t>
+            </a:r>
+            <a:r>
+              <a:rPr lang="en-US" dirty="0" err="1"/>
+              <a:t>agyonvághatja</a:t>
+            </a:r>
+            <a:r>
+              <a:rPr lang="en-US" dirty="0"/>
+              <a:t> a </a:t>
+            </a:r>
+            <a:r>
+              <a:rPr lang="en-US" i="1" dirty="0"/>
+              <a:t>geometry </a:t>
+            </a:r>
+            <a:r>
+              <a:rPr lang="en-US" i="1" dirty="0" err="1"/>
+              <a:t>shader</a:t>
+            </a:r>
+            <a:r>
+              <a:rPr lang="en-US" dirty="0"/>
+              <a:t>-t (</a:t>
+            </a:r>
+            <a:r>
+              <a:rPr lang="en-US" dirty="0" err="1"/>
+              <a:t>nekem</a:t>
+            </a:r>
+            <a:r>
+              <a:rPr lang="en-US" dirty="0"/>
+              <a:t> </a:t>
+            </a:r>
+            <a:r>
+              <a:rPr lang="en-US" dirty="0" err="1"/>
+              <a:t>már</a:t>
+            </a:r>
+            <a:r>
+              <a:rPr lang="en-US" dirty="0"/>
+              <a:t> </a:t>
+            </a:r>
+            <a:r>
+              <a:rPr lang="en-US" dirty="0" err="1"/>
+              <a:t>sikerült</a:t>
+            </a:r>
+            <a:r>
+              <a:rPr lang="en-US" dirty="0"/>
+              <a:t>…)</a:t>
+            </a:r>
+          </a:p>
+          <a:p>
+            <a:pPr>
+              <a:buFont typeface="Wingdings" panose="05000000000000000000" pitchFamily="2" charset="2"/>
+              <a:buChar char="§"/>
+            </a:pPr>
+            <a:r>
+              <a:rPr lang="en-US" dirty="0"/>
+              <a:t>A program </a:t>
+            </a:r>
+            <a:r>
+              <a:rPr lang="en-US" i="1" dirty="0" err="1"/>
+              <a:t>fillrate</a:t>
+            </a:r>
+            <a:r>
+              <a:rPr lang="en-US" i="1" dirty="0"/>
+              <a:t> bound</a:t>
+            </a:r>
+            <a:r>
+              <a:rPr lang="en-US" dirty="0"/>
+              <a:t> </a:t>
+            </a:r>
+            <a:r>
+              <a:rPr lang="en-US" dirty="0" err="1"/>
+              <a:t>lesz</a:t>
+            </a:r>
+            <a:r>
+              <a:rPr lang="en-US" dirty="0"/>
+              <a:t> (a </a:t>
+            </a:r>
+            <a:r>
+              <a:rPr lang="en-US" i="1" dirty="0"/>
+              <a:t>stencil buffer</a:t>
+            </a:r>
+            <a:r>
+              <a:rPr lang="en-US" dirty="0"/>
+              <a:t> </a:t>
+            </a:r>
+            <a:r>
+              <a:rPr lang="en-US" dirty="0" err="1"/>
+              <a:t>kitöltése</a:t>
+            </a:r>
+            <a:r>
+              <a:rPr lang="en-US" dirty="0"/>
+              <a:t> </a:t>
+            </a:r>
+            <a:r>
+              <a:rPr lang="en-US" dirty="0" err="1"/>
+              <a:t>miatt</a:t>
+            </a:r>
+            <a:r>
+              <a:rPr lang="en-US" dirty="0"/>
+              <a:t>)</a:t>
+            </a:r>
+          </a:p>
+          <a:p>
+            <a:pPr>
+              <a:buFont typeface="Wingdings" panose="05000000000000000000" pitchFamily="2" charset="2"/>
+              <a:buChar char="§"/>
+            </a:pPr>
+            <a:endParaRPr lang="en-US" dirty="0"/>
+          </a:p>
+          <a:p>
+            <a:pPr>
+              <a:buFont typeface="Wingdings" panose="05000000000000000000" pitchFamily="2" charset="2"/>
+              <a:buChar char="§"/>
+            </a:pPr>
+            <a:r>
+              <a:rPr lang="en-US" dirty="0" err="1"/>
+              <a:t>Nem</a:t>
+            </a:r>
+            <a:r>
+              <a:rPr lang="en-US" dirty="0"/>
+              <a:t> </a:t>
+            </a:r>
+            <a:r>
+              <a:rPr lang="en-US" dirty="0" err="1"/>
+              <a:t>mindenhol</a:t>
+            </a:r>
+            <a:r>
+              <a:rPr lang="en-US" dirty="0"/>
+              <a:t> </a:t>
+            </a:r>
+            <a:r>
+              <a:rPr lang="en-US" dirty="0" err="1"/>
+              <a:t>jön</a:t>
+            </a:r>
+            <a:r>
+              <a:rPr lang="en-US" dirty="0"/>
+              <a:t> </a:t>
+            </a:r>
+            <a:r>
+              <a:rPr lang="en-US" dirty="0" err="1"/>
+              <a:t>elő</a:t>
+            </a:r>
+            <a:r>
+              <a:rPr lang="en-US" dirty="0"/>
+              <a:t>, de </a:t>
+            </a:r>
+            <a:r>
+              <a:rPr lang="en-US" dirty="0" err="1"/>
+              <a:t>ugyanazzal</a:t>
+            </a:r>
+            <a:r>
+              <a:rPr lang="en-US" dirty="0"/>
+              <a:t> a </a:t>
+            </a:r>
+            <a:r>
+              <a:rPr lang="en-US" dirty="0" err="1"/>
+              <a:t>shader</a:t>
+            </a:r>
+            <a:r>
+              <a:rPr lang="en-US" dirty="0"/>
+              <a:t> </a:t>
+            </a:r>
+            <a:r>
+              <a:rPr lang="en-US" dirty="0" err="1"/>
+              <a:t>programmal</a:t>
+            </a:r>
+            <a:r>
+              <a:rPr lang="en-US" dirty="0"/>
+              <a:t> </a:t>
+            </a:r>
+            <a:r>
+              <a:rPr lang="en-US" dirty="0" err="1"/>
+              <a:t>kell</a:t>
+            </a:r>
+            <a:r>
+              <a:rPr lang="en-US" dirty="0"/>
+              <a:t> </a:t>
+            </a:r>
+            <a:r>
+              <a:rPr lang="en-US" dirty="0" err="1"/>
+              <a:t>rajzolni</a:t>
+            </a:r>
+            <a:r>
+              <a:rPr lang="en-US" dirty="0"/>
+              <a:t> a </a:t>
+            </a:r>
+            <a:r>
+              <a:rPr lang="en-US" i="1" dirty="0"/>
+              <a:t>shadow volume</a:t>
+            </a:r>
+            <a:r>
+              <a:rPr lang="en-US" dirty="0"/>
+              <a:t>-</a:t>
+            </a:r>
+            <a:r>
+              <a:rPr lang="en-US" dirty="0" err="1"/>
+              <a:t>okat</a:t>
+            </a:r>
+            <a:r>
+              <a:rPr lang="en-US" dirty="0"/>
+              <a:t>, </a:t>
+            </a:r>
+            <a:r>
+              <a:rPr lang="en-US" dirty="0" err="1"/>
+              <a:t>amivel</a:t>
+            </a:r>
+            <a:r>
+              <a:rPr lang="en-US" dirty="0"/>
+              <a:t> a </a:t>
+            </a:r>
+            <a:r>
+              <a:rPr lang="en-US" i="1" dirty="0"/>
+              <a:t>depth buffer</a:t>
+            </a:r>
+            <a:r>
+              <a:rPr lang="en-US" dirty="0"/>
+              <a:t>-t </a:t>
+            </a:r>
+            <a:r>
+              <a:rPr lang="en-US" dirty="0" err="1"/>
+              <a:t>kitöltötted</a:t>
+            </a:r>
+            <a:r>
+              <a:rPr lang="en-US" dirty="0"/>
+              <a:t>, </a:t>
+            </a:r>
+            <a:r>
+              <a:rPr lang="en-US" dirty="0" err="1"/>
+              <a:t>különben</a:t>
+            </a:r>
+            <a:r>
+              <a:rPr lang="en-US" dirty="0"/>
+              <a:t> </a:t>
+            </a:r>
+            <a:r>
+              <a:rPr lang="en-US" i="1" dirty="0" err="1"/>
+              <a:t>zfight-</a:t>
+            </a:r>
+            <a:r>
+              <a:rPr lang="en-US" dirty="0" err="1"/>
+              <a:t>olni</a:t>
+            </a:r>
+            <a:r>
+              <a:rPr lang="en-US" dirty="0"/>
+              <a:t> fog a </a:t>
+            </a:r>
+            <a:r>
+              <a:rPr lang="en-US" i="1" dirty="0"/>
+              <a:t>front cap</a:t>
+            </a:r>
+          </a:p>
+          <a:p>
+            <a:pPr>
+              <a:buFont typeface="Wingdings" panose="05000000000000000000" pitchFamily="2" charset="2"/>
+              <a:buChar char="§"/>
+            </a:pPr>
+            <a:endParaRPr lang="en-US" dirty="0"/>
+          </a:p>
+          <a:p>
+            <a:pPr>
+              <a:buFont typeface="Wingdings" panose="05000000000000000000" pitchFamily="2" charset="2"/>
+              <a:buChar char="§"/>
+            </a:pPr>
+            <a:r>
+              <a:rPr lang="en-US" dirty="0" err="1"/>
+              <a:t>Az</a:t>
+            </a:r>
+            <a:r>
+              <a:rPr lang="en-US" dirty="0"/>
+              <a:t> </a:t>
+            </a:r>
+            <a:r>
+              <a:rPr lang="en-US" i="1" dirty="0" err="1"/>
+              <a:t>ArchiCAD</a:t>
+            </a:r>
+            <a:r>
+              <a:rPr lang="en-US" dirty="0"/>
+              <a:t> </a:t>
+            </a:r>
+            <a:r>
+              <a:rPr lang="en-US" dirty="0" err="1"/>
+              <a:t>jelenleg</a:t>
+            </a:r>
+            <a:r>
+              <a:rPr lang="en-US" dirty="0"/>
+              <a:t> </a:t>
+            </a:r>
+            <a:r>
+              <a:rPr lang="en-US" dirty="0" err="1"/>
+              <a:t>ezek</a:t>
+            </a:r>
+            <a:r>
+              <a:rPr lang="en-US" dirty="0"/>
+              <a:t> </a:t>
+            </a:r>
+            <a:r>
+              <a:rPr lang="en-US" dirty="0" err="1"/>
+              <a:t>miatt</a:t>
+            </a:r>
+            <a:r>
+              <a:rPr lang="en-US" dirty="0"/>
+              <a:t> </a:t>
+            </a:r>
+            <a:r>
+              <a:rPr lang="en-US" dirty="0" err="1"/>
+              <a:t>nem</a:t>
+            </a:r>
+            <a:r>
+              <a:rPr lang="en-US" dirty="0"/>
+              <a:t> </a:t>
+            </a:r>
+            <a:r>
+              <a:rPr lang="en-US" dirty="0" err="1"/>
+              <a:t>használ</a:t>
+            </a:r>
+            <a:r>
+              <a:rPr lang="en-US" dirty="0"/>
+              <a:t> geometry </a:t>
+            </a:r>
+            <a:r>
+              <a:rPr lang="en-US" dirty="0" err="1"/>
+              <a:t>shader</a:t>
+            </a:r>
+            <a:r>
+              <a:rPr lang="en-US" dirty="0"/>
+              <a:t>-t</a:t>
+            </a:r>
+          </a:p>
+          <a:p>
+            <a:pPr>
+              <a:buFont typeface="Wingdings" panose="05000000000000000000" pitchFamily="2" charset="2"/>
+              <a:buChar char="§"/>
+            </a:pPr>
+            <a:r>
+              <a:rPr lang="en-US" b="1" dirty="0"/>
+              <a:t>Na de</a:t>
+            </a:r>
+            <a:r>
+              <a:rPr lang="en-US" dirty="0"/>
+              <a:t>: </a:t>
+            </a:r>
+            <a:r>
+              <a:rPr lang="en-US" i="1" dirty="0"/>
+              <a:t>Metal</a:t>
+            </a:r>
+            <a:r>
+              <a:rPr lang="en-US" dirty="0"/>
+              <a:t>-ban </a:t>
+            </a:r>
+            <a:r>
+              <a:rPr lang="en-US" dirty="0" err="1"/>
+              <a:t>nincs</a:t>
+            </a:r>
+            <a:r>
+              <a:rPr lang="en-US" dirty="0"/>
+              <a:t> is! </a:t>
+            </a:r>
+            <a:r>
+              <a:rPr lang="en-US" dirty="0" err="1"/>
+              <a:t>Helyette</a:t>
+            </a:r>
+            <a:r>
+              <a:rPr lang="en-US" dirty="0"/>
+              <a:t> </a:t>
+            </a:r>
+            <a:r>
+              <a:rPr lang="en-US" i="1" dirty="0"/>
+              <a:t>vertex </a:t>
+            </a:r>
+            <a:r>
+              <a:rPr lang="en-US" i="1" dirty="0" err="1"/>
+              <a:t>shader</a:t>
+            </a:r>
+            <a:r>
+              <a:rPr lang="en-US" dirty="0" err="1"/>
+              <a:t>-rel</a:t>
+            </a:r>
+            <a:r>
+              <a:rPr lang="en-US" dirty="0"/>
+              <a:t> </a:t>
+            </a:r>
+            <a:r>
+              <a:rPr lang="en-US" dirty="0" err="1"/>
+              <a:t>emulálható</a:t>
+            </a:r>
+            <a:r>
+              <a:rPr lang="en-US" dirty="0"/>
+              <a:t>, </a:t>
+            </a:r>
+            <a:r>
+              <a:rPr lang="en-US" dirty="0" err="1"/>
+              <a:t>szóval</a:t>
+            </a:r>
+            <a:r>
+              <a:rPr lang="en-US" dirty="0"/>
+              <a:t> </a:t>
+            </a:r>
+            <a:r>
+              <a:rPr lang="en-US" dirty="0" err="1"/>
+              <a:t>ez</a:t>
+            </a:r>
+            <a:r>
+              <a:rPr lang="en-US" dirty="0"/>
+              <a:t> </a:t>
+            </a:r>
+            <a:r>
+              <a:rPr lang="en-US" dirty="0" err="1"/>
+              <a:t>javulhat</a:t>
+            </a:r>
+            <a:r>
+              <a:rPr lang="en-US" dirty="0"/>
+              <a:t> a </a:t>
+            </a:r>
+            <a:r>
+              <a:rPr lang="en-US" dirty="0" err="1"/>
+              <a:t>jövőben</a:t>
+            </a:r>
+            <a:endParaRPr lang="hu-HU" dirty="0"/>
+          </a:p>
+        </p:txBody>
+      </p:sp>
+    </p:spTree>
+    <p:extLst>
+      <p:ext uri="{BB962C8B-B14F-4D97-AF65-F5344CB8AC3E}">
+        <p14:creationId xmlns:p14="http://schemas.microsoft.com/office/powerpoint/2010/main" val="404411492"/>
+      </p:ext>
+    </p:extLst>
+  </p:cSld>
+  <p:clrMapOvr>
+    <a:masterClrMapping/>
+  </p:clrMapOvr>
+</p:sld>
+</file>
+
+<file path=ppt/slides/slide11.xml><?xml version="1.0" encoding="utf-8"?>
+<p:sld xmlns:a="http://schemas.openxmlformats.org/drawingml/2006/main" xmlns:r="http://schemas.openxmlformats.org/officeDocument/2006/relationships" xmlns:p="http://schemas.openxmlformats.org/presentationml/2006/main">
+  <p:cSld>
     <p:bg>
       <p:bgPr>
         <a:solidFill>
@@ -5356,10 +5978,7 @@
               <a:rPr lang="en-US" dirty="0" err="1"/>
               <a:t>vetnie</a:t>
             </a:r>
-            <a:r>
-              <a:rPr lang="en-US" dirty="0"/>
-              <a:t>.</a:t>
-            </a:r>
+            <a:endParaRPr lang="en-US" dirty="0"/>
           </a:p>
           <a:p>
             <a:pPr>
@@ -5594,10 +6213,7 @@
               <a:rPr lang="en-US" dirty="0" err="1"/>
               <a:t>recés</a:t>
             </a:r>
-            <a:r>
-              <a:rPr lang="en-US" dirty="0"/>
-              <a:t>.</a:t>
-            </a:r>
+            <a:endParaRPr lang="en-US" dirty="0"/>
           </a:p>
           <a:p>
             <a:pPr>
@@ -7403,13 +8019,91 @@
             </a:r>
           </a:p>
           <a:p>
+            <a:pPr lvl="1">
+              <a:buFont typeface="Wingdings" panose="05000000000000000000" pitchFamily="2" charset="2"/>
+              <a:buChar char="q"/>
+            </a:pPr>
+            <a:r>
+              <a:rPr lang="en-US" dirty="0"/>
+              <a:t>A </a:t>
+            </a:r>
+            <a:r>
+              <a:rPr lang="en-US" dirty="0" err="1"/>
+              <a:t>palást</a:t>
+            </a:r>
+            <a:r>
+              <a:rPr lang="en-US" dirty="0"/>
+              <a:t> </a:t>
+            </a:r>
+            <a:r>
+              <a:rPr lang="en-US" dirty="0" err="1"/>
+              <a:t>pedig</a:t>
+            </a:r>
+            <a:r>
+              <a:rPr lang="en-US" dirty="0"/>
+              <a:t> </a:t>
+            </a:r>
+            <a:r>
+              <a:rPr lang="en-US" dirty="0" err="1"/>
+              <a:t>élvertexek</a:t>
+            </a:r>
+            <a:r>
+              <a:rPr lang="en-US" dirty="0"/>
+              <a:t> ill. </a:t>
+            </a:r>
+            <a:r>
+              <a:rPr lang="en-US" dirty="0" err="1"/>
+              <a:t>ezek</a:t>
+            </a:r>
+            <a:r>
+              <a:rPr lang="en-US" dirty="0"/>
+              <a:t> </a:t>
+            </a:r>
+            <a:r>
+              <a:rPr lang="en-US" dirty="0" err="1"/>
+              <a:t>kivetítve</a:t>
+            </a:r>
+            <a:r>
+              <a:rPr lang="en-US" dirty="0"/>
+              <a:t> a </a:t>
+            </a:r>
+            <a:r>
+              <a:rPr lang="en-US" dirty="0" err="1"/>
+              <a:t>fényirány</a:t>
+            </a:r>
+            <a:r>
+              <a:rPr lang="en-US" dirty="0"/>
+              <a:t> </a:t>
+            </a:r>
+            <a:r>
+              <a:rPr lang="en-US" dirty="0" err="1"/>
+              <a:t>mentén</a:t>
+            </a:r>
+            <a:r>
+              <a:rPr lang="en-US" dirty="0"/>
+              <a:t> (4 vertex </a:t>
+            </a:r>
+            <a:r>
+              <a:rPr lang="en-US" dirty="0" err="1"/>
+              <a:t>élenként</a:t>
+            </a:r>
+            <a:r>
+              <a:rPr lang="en-US" dirty="0"/>
+              <a:t>)</a:t>
+            </a:r>
+          </a:p>
+          <a:p>
             <a:pPr>
               <a:buFont typeface="Wingdings" panose="05000000000000000000" pitchFamily="2" charset="2"/>
               <a:buChar char="§"/>
             </a:pPr>
             <a:r>
-              <a:rPr lang="en-US" dirty="0"/>
-              <a:t>De </a:t>
+              <a:rPr lang="en-US" dirty="0" err="1"/>
+              <a:t>Baj</a:t>
+            </a:r>
+            <a:r>
+              <a:rPr lang="en-US" dirty="0"/>
+              <a:t>: </a:t>
             </a:r>
             <a:r>
               <a:rPr lang="en-US" dirty="0" err="1"/>
@@ -7489,12 +8183,9 @@
             </a:r>
             <a:r>
               <a:rPr lang="en-US" dirty="0" err="1"/>
-              <a:t>-olni</a:t>
-            </a:r>
-            <a:r>
-              <a:rPr lang="en-US" dirty="0"/>
-              <a:t> fog</a:t>
-            </a:r>
+              <a:t>-ol</a:t>
+            </a:r>
+            <a:endParaRPr lang="en-US" dirty="0"/>
           </a:p>
           <a:p>
             <a:pPr>
@@ -7547,17 +8238,28 @@
             </a:r>
             <a:r>
               <a:rPr lang="en-US" dirty="0" err="1"/>
-              <a:t>eredeti</a:t>
-            </a:r>
-            <a:r>
-              <a:rPr lang="en-US" dirty="0"/>
-              <a:t> </a:t>
-            </a:r>
-            <a:r>
-              <a:rPr lang="en-US" dirty="0" err="1"/>
               <a:t>objektum</a:t>
             </a:r>
-            <a:endParaRPr lang="en-US" dirty="0"/>
+            <a:r>
+              <a:rPr lang="en-US" dirty="0"/>
+              <a:t> (</a:t>
+            </a:r>
+            <a:r>
+              <a:rPr lang="en-US" dirty="0" err="1"/>
+              <a:t>vagy</a:t>
+            </a:r>
+            <a:r>
+              <a:rPr lang="en-US" dirty="0"/>
+              <a:t> told </a:t>
+            </a:r>
+            <a:r>
+              <a:rPr lang="en-US" dirty="0" err="1"/>
+              <a:t>beljebb</a:t>
+            </a:r>
+            <a:r>
+              <a:rPr lang="en-US" dirty="0"/>
+              <a:t>…)</a:t>
+            </a:r>
           </a:p>
           <a:p>
             <a:pPr>
@@ -7574,35 +8276,23 @@
             </a:r>
             <a:r>
               <a:rPr lang="en-US" dirty="0"/>
-              <a:t> is </a:t>
-            </a:r>
-            <a:r>
-              <a:rPr lang="en-US" i="1" dirty="0" err="1"/>
-              <a:t>zfight</a:t>
-            </a:r>
-            <a:r>
-              <a:rPr lang="en-US" dirty="0" err="1"/>
-              <a:t>-olhat</a:t>
-            </a:r>
-            <a:r>
-              <a:rPr lang="en-US" dirty="0"/>
-              <a:t>, de </a:t>
-            </a:r>
-            <a:r>
-              <a:rPr lang="en-US" dirty="0" err="1"/>
-              <a:t>erre</a:t>
-            </a:r>
-            <a:r>
-              <a:rPr lang="en-US" dirty="0"/>
-              <a:t> </a:t>
-            </a:r>
-            <a:r>
-              <a:rPr lang="en-US" dirty="0" err="1"/>
-              <a:t>ott</a:t>
-            </a:r>
-            <a:r>
-              <a:rPr lang="en-US" dirty="0"/>
-              <a:t> van a </a:t>
+              <a:t>-</a:t>
+            </a:r>
+            <a:r>
+              <a:rPr lang="en-US" dirty="0" err="1"/>
+              <a:t>hez</a:t>
+            </a:r>
+            <a:r>
+              <a:rPr lang="en-US" dirty="0"/>
+              <a:t> </a:t>
+            </a:r>
+            <a:r>
+              <a:rPr lang="en-US" dirty="0" err="1"/>
+              <a:t>használható</a:t>
+            </a:r>
+            <a:r>
+              <a:rPr lang="en-US" dirty="0"/>
+              <a:t> a </a:t>
             </a:r>
             <a:r>
               <a:rPr lang="en-US" sz="1600" dirty="0">
@@ -7624,7 +8314,7 @@
             </a:r>
             <a:r>
               <a:rPr lang="en-US" i="1" dirty="0"/>
-              <a:t>clipping</a:t>
+              <a:t>near/far clipping</a:t>
             </a:r>
             <a:r>
               <a:rPr lang="en-US" dirty="0"/>
@@ -7637,8 +8327,8 @@
               <a:buChar char="§"/>
             </a:pPr>
             <a:r>
-              <a:rPr lang="en-US" dirty="0" err="1"/>
-              <a:t>Alternatíva</a:t>
+              <a:rPr lang="en-US" b="1" dirty="0" err="1"/>
+              <a:t>Vagy</a:t>
             </a:r>
             <a:r>
               <a:rPr lang="en-US" dirty="0"/>
@@ -7662,15 +8352,15 @@
             </a:r>
             <a:r>
               <a:rPr lang="en-US" dirty="0" err="1"/>
+              <a:t>módosítod</a:t>
+            </a:r>
+            <a:r>
+              <a:rPr lang="en-US" dirty="0"/>
+              <a:t> </a:t>
+            </a:r>
+            <a:r>
+              <a:rPr lang="en-US" dirty="0" err="1"/>
               <a:t>úgy</a:t>
-            </a:r>
-            <a:r>
-              <a:rPr lang="en-US" dirty="0"/>
-              <a:t> </a:t>
-            </a:r>
-            <a:r>
-              <a:rPr lang="en-US" dirty="0" err="1"/>
-              <a:t>módosítod</a:t>
             </a:r>
             <a:r>
               <a:rPr lang="en-US" dirty="0"/>
@@ -7719,94 +8409,81 @@
               <a:buFont typeface="Wingdings" panose="05000000000000000000" pitchFamily="2" charset="2"/>
               <a:buChar char="§"/>
             </a:pPr>
-            <a:endParaRPr lang="en-US" dirty="0"/>
-          </a:p>
-          <a:p>
-            <a:pPr>
-              <a:buFont typeface="Wingdings" panose="05000000000000000000" pitchFamily="2" charset="2"/>
-              <a:buChar char="§"/>
-            </a:pPr>
-            <a:r>
-              <a:rPr lang="en-US" dirty="0"/>
-              <a:t>A </a:t>
-            </a:r>
-            <a:r>
-              <a:rPr lang="en-US" dirty="0" err="1"/>
-              <a:t>palást</a:t>
-            </a:r>
-            <a:r>
-              <a:rPr lang="en-US" dirty="0"/>
-              <a:t> </a:t>
-            </a:r>
-            <a:r>
-              <a:rPr lang="en-US" dirty="0" err="1"/>
-              <a:t>hasonlóan</a:t>
-            </a:r>
-            <a:r>
-              <a:rPr lang="en-US" dirty="0"/>
-              <a:t> </a:t>
-            </a:r>
-            <a:r>
-              <a:rPr lang="en-US" dirty="0" err="1"/>
-              <a:t>áll</a:t>
-            </a:r>
-            <a:r>
-              <a:rPr lang="en-US" dirty="0"/>
-              <a:t> </a:t>
-            </a:r>
-            <a:r>
-              <a:rPr lang="en-US" dirty="0" err="1"/>
-              <a:t>elő</a:t>
-            </a:r>
-            <a:r>
-              <a:rPr lang="en-US" dirty="0"/>
-              <a:t> a </a:t>
-            </a:r>
-            <a:r>
-              <a:rPr lang="en-US" dirty="0" err="1"/>
-              <a:t>sziluettből</a:t>
+            <a:r>
+              <a:rPr lang="en-US" dirty="0"/>
+              <a:t>Amit </a:t>
+            </a:r>
+            <a:r>
+              <a:rPr lang="en-US" b="1" dirty="0"/>
+              <a:t>ne </a:t>
+            </a:r>
+            <a:r>
+              <a:rPr lang="en-US" b="1" dirty="0" err="1"/>
+              <a:t>használj</a:t>
             </a:r>
             <a:r>
               <a:rPr lang="en-US" dirty="0"/>
               <a:t>: </a:t>
             </a:r>
             <a:r>
-              <a:rPr lang="en-US" dirty="0" err="1"/>
-              <a:t>élvertexek</a:t>
-            </a:r>
-            <a:r>
-              <a:rPr lang="en-US" dirty="0"/>
-              <a:t> + </a:t>
-            </a:r>
-            <a:r>
-              <a:rPr lang="en-US" dirty="0" err="1"/>
-              <a:t>ezek</a:t>
-            </a:r>
-            <a:r>
-              <a:rPr lang="en-US" dirty="0"/>
-              <a:t> </a:t>
-            </a:r>
-            <a:r>
-              <a:rPr lang="en-US" dirty="0" err="1"/>
-              <a:t>kivetítve</a:t>
-            </a:r>
-            <a:r>
-              <a:rPr lang="en-US" dirty="0"/>
-              <a:t> a </a:t>
-            </a:r>
-            <a:r>
-              <a:rPr lang="en-US" dirty="0" err="1"/>
-              <a:t>fényirány</a:t>
-            </a:r>
-            <a:r>
-              <a:rPr lang="en-US" dirty="0"/>
-              <a:t> </a:t>
-            </a:r>
-            <a:r>
-              <a:rPr lang="en-US" dirty="0" err="1"/>
-              <a:t>mentén</a:t>
-            </a:r>
-            <a:endParaRPr lang="en-US" dirty="0"/>
+              <a:rPr lang="en-US" sz="1600" dirty="0" err="1">
+                <a:latin typeface="Consolas" panose="020B0609020204030204" pitchFamily="49" charset="0"/>
+              </a:rPr>
+              <a:t>glPolygonOffset</a:t>
+            </a:r>
+            <a:r>
+              <a:rPr lang="en-US" sz="1600" dirty="0">
+                <a:latin typeface="Consolas" panose="020B0609020204030204" pitchFamily="49" charset="0"/>
+              </a:rPr>
+              <a:t> </a:t>
+            </a:r>
+            <a:r>
+              <a:rPr lang="en-US" dirty="0" err="1"/>
+              <a:t>Bár</a:t>
+            </a:r>
+            <a:r>
+              <a:rPr lang="en-US" dirty="0"/>
+              <a:t> </a:t>
+            </a:r>
+            <a:r>
+              <a:rPr lang="en-US" dirty="0" err="1"/>
+              <a:t>szimpatikus</a:t>
+            </a:r>
+            <a:r>
+              <a:rPr lang="en-US" dirty="0"/>
+              <a:t> </a:t>
+            </a:r>
+            <a:r>
+              <a:rPr lang="en-US" dirty="0" err="1"/>
+              <a:t>megoldás</a:t>
+            </a:r>
+            <a:r>
+              <a:rPr lang="en-US" dirty="0"/>
+              <a:t>, </a:t>
+            </a:r>
+            <a:r>
+              <a:rPr lang="en-US" i="1" dirty="0"/>
+              <a:t>artifact</a:t>
+            </a:r>
+            <a:r>
+              <a:rPr lang="en-US" dirty="0"/>
+              <a:t>-</a:t>
+            </a:r>
+            <a:r>
+              <a:rPr lang="en-US" dirty="0" err="1"/>
+              <a:t>okat</a:t>
+            </a:r>
+            <a:r>
+              <a:rPr lang="en-US" dirty="0"/>
+              <a:t> </a:t>
+            </a:r>
+            <a:r>
+              <a:rPr lang="en-US" dirty="0" err="1"/>
+              <a:t>okozhat</a:t>
+            </a:r>
+            <a:endParaRPr lang="en-US" sz="1600" dirty="0">
+              <a:latin typeface="Consolas" panose="020B0609020204030204" pitchFamily="49" charset="0"/>
+            </a:endParaRPr>
           </a:p>
           <a:p>
             <a:pPr>
@@ -8284,15 +8961,11 @@
               <a:buChar char="§"/>
             </a:pPr>
             <a:r>
-              <a:rPr lang="en-US" dirty="0" err="1"/>
-              <a:t>Nulladik</a:t>
-            </a:r>
-            <a:r>
-              <a:rPr lang="en-US" dirty="0"/>
-              <a:t> </a:t>
-            </a:r>
-            <a:r>
-              <a:rPr lang="en-US" dirty="0" err="1"/>
+              <a:rPr lang="en-US" b="1" dirty="0"/>
+              <a:t>0. </a:t>
+            </a:r>
+            <a:r>
+              <a:rPr lang="en-US" b="1" dirty="0" err="1"/>
               <a:t>lépés</a:t>
             </a:r>
             <a:r>
@@ -8335,10 +9008,7 @@
               <a:rPr lang="en-US" dirty="0" err="1"/>
               <a:t>okat</a:t>
             </a:r>
-            <a:r>
-              <a:rPr lang="en-US" dirty="0"/>
-              <a:t>.</a:t>
-            </a:r>
+            <a:endParaRPr lang="en-US" dirty="0"/>
           </a:p>
           <a:p>
             <a:pPr>
@@ -8347,25 +9017,16 @@
             </a:pPr>
             <a:r>
               <a:rPr lang="en-US" i="1" dirty="0"/>
-              <a:t>z-write</a:t>
-            </a:r>
-            <a:r>
-              <a:rPr lang="en-US" dirty="0"/>
-              <a:t>-</a:t>
-            </a:r>
-            <a:r>
-              <a:rPr lang="en-US" dirty="0" err="1"/>
-              <a:t>ot</a:t>
-            </a:r>
-            <a:r>
-              <a:rPr lang="en-US" dirty="0"/>
-              <a:t> </a:t>
-            </a:r>
-            <a:r>
-              <a:rPr lang="en-US" dirty="0" err="1"/>
-              <a:t>letiltod</a:t>
-            </a:r>
-            <a:endParaRPr lang="en-US" dirty="0"/>
+              <a:t>[color/z-write </a:t>
+            </a:r>
+            <a:r>
+              <a:rPr lang="en-US" i="1" dirty="0" err="1"/>
+              <a:t>letilt</a:t>
+            </a:r>
+            <a:r>
+              <a:rPr lang="en-US" i="1" dirty="0"/>
+              <a:t>]</a:t>
+            </a:r>
           </a:p>
           <a:p>
             <a:pPr>
@@ -8373,8 +9034,16 @@
               <a:buChar char="§"/>
             </a:pPr>
             <a:r>
-              <a:rPr lang="en-US" dirty="0"/>
-              <a:t>A </a:t>
+              <a:rPr lang="en-US" b="1" dirty="0"/>
+              <a:t>1. </a:t>
+            </a:r>
+            <a:r>
+              <a:rPr lang="en-US" b="1" dirty="0" err="1"/>
+              <a:t>lépés</a:t>
+            </a:r>
+            <a:r>
+              <a:rPr lang="en-US" dirty="0"/>
+              <a:t>: </a:t>
             </a:r>
             <a:r>
               <a:rPr lang="en-US" i="1" dirty="0"/>
@@ -8390,15 +9059,7 @@
             </a:r>
             <a:r>
               <a:rPr lang="en-US" dirty="0"/>
-              <a:t> </a:t>
-            </a:r>
-            <a:r>
-              <a:rPr lang="en-US" dirty="0" err="1"/>
-              <a:t>után</a:t>
-            </a:r>
-            <a:r>
-              <a:rPr lang="en-US" dirty="0"/>
-              <a:t> ha </a:t>
+              <a:t>. Ha </a:t>
             </a:r>
             <a:r>
               <a:rPr lang="en-US" dirty="0" err="1"/>
@@ -8452,102 +9113,17 @@
               <a:buChar char="§"/>
             </a:pPr>
             <a:r>
-              <a:rPr lang="en-US" dirty="0" err="1"/>
-              <a:t>Szóval</a:t>
-            </a:r>
-            <a:r>
-              <a:rPr lang="en-US" dirty="0"/>
-              <a:t> a </a:t>
-            </a:r>
-            <a:r>
               <a:rPr lang="en-US" i="1" dirty="0"/>
-              <a:t>stencil </a:t>
+              <a:t>[color write </a:t>
             </a:r>
             <a:r>
               <a:rPr lang="en-US" i="1" dirty="0" err="1"/>
-              <a:t>func</a:t>
-            </a:r>
-            <a:r>
-              <a:rPr lang="en-US" dirty="0"/>
-              <a:t> </a:t>
-            </a:r>
-            <a:r>
-              <a:rPr lang="en-US" dirty="0" err="1"/>
-              <a:t>legyen</a:t>
-            </a:r>
-            <a:r>
-              <a:rPr lang="en-US" dirty="0"/>
-              <a:t> </a:t>
-            </a:r>
-            <a:r>
-              <a:rPr lang="en-US" dirty="0" err="1"/>
-              <a:t>az</a:t>
-            </a:r>
-            <a:r>
-              <a:rPr lang="en-US" dirty="0"/>
-              <a:t>, </a:t>
-            </a:r>
-            <a:r>
-              <a:rPr lang="en-US" dirty="0" err="1"/>
-              <a:t>hogy</a:t>
-            </a:r>
-            <a:r>
-              <a:rPr lang="en-US" dirty="0"/>
-              <a:t> </a:t>
-            </a:r>
-            <a:r>
-              <a:rPr lang="en-US" dirty="0" err="1"/>
-              <a:t>csak</a:t>
-            </a:r>
-            <a:r>
-              <a:rPr lang="en-US" dirty="0"/>
-              <a:t> </a:t>
-            </a:r>
-            <a:r>
-              <a:rPr lang="en-US" dirty="0" err="1"/>
-              <a:t>azokat</a:t>
-            </a:r>
-            <a:r>
-              <a:rPr lang="en-US" dirty="0"/>
-              <a:t> a </a:t>
-            </a:r>
-            <a:r>
-              <a:rPr lang="en-US" dirty="0" err="1"/>
-              <a:t>fragmenteket</a:t>
-            </a:r>
-            <a:r>
-              <a:rPr lang="en-US" dirty="0"/>
-              <a:t> </a:t>
-            </a:r>
-            <a:r>
-              <a:rPr lang="en-US" dirty="0" err="1"/>
-              <a:t>engeded</a:t>
-            </a:r>
-            <a:r>
-              <a:rPr lang="en-US" dirty="0"/>
-              <a:t> </a:t>
-            </a:r>
-            <a:r>
-              <a:rPr lang="en-US" dirty="0" err="1"/>
-              <a:t>át</a:t>
-            </a:r>
-            <a:r>
-              <a:rPr lang="en-US" dirty="0"/>
-              <a:t>, </a:t>
-            </a:r>
-            <a:r>
-              <a:rPr lang="en-US" dirty="0" err="1"/>
-              <a:t>ahol</a:t>
-            </a:r>
-            <a:r>
-              <a:rPr lang="en-US" dirty="0"/>
-              <a:t> </a:t>
-            </a:r>
-            <a:r>
-              <a:rPr lang="en-US" dirty="0" err="1"/>
-              <a:t>nulla</a:t>
-            </a:r>
-            <a:endParaRPr lang="en-US" dirty="0"/>
+              <a:t>engedélyez</a:t>
+            </a:r>
+            <a:r>
+              <a:rPr lang="en-US" i="1" dirty="0"/>
+              <a:t>]</a:t>
+            </a:r>
           </a:p>
           <a:p>
             <a:pPr>
@@ -8555,52 +9131,119 @@
               <a:buChar char="§"/>
             </a:pPr>
             <a:r>
-              <a:rPr lang="en-US" dirty="0" err="1"/>
-              <a:t>Utóbbi</a:t>
-            </a:r>
-            <a:r>
-              <a:rPr lang="en-US" dirty="0"/>
-              <a:t> </a:t>
-            </a:r>
-            <a:r>
-              <a:rPr lang="en-US" dirty="0" err="1"/>
+              <a:rPr lang="en-US" b="1" dirty="0"/>
+              <a:t>2. </a:t>
+            </a:r>
+            <a:r>
+              <a:rPr lang="en-US" b="1" dirty="0" err="1"/>
+              <a:t>lépés</a:t>
+            </a:r>
+            <a:r>
+              <a:rPr lang="en-US" dirty="0"/>
+              <a:t>: </a:t>
+            </a:r>
+            <a:r>
+              <a:rPr lang="en-US" dirty="0" err="1"/>
+              <a:t>rajzolás</a:t>
+            </a:r>
+            <a:r>
+              <a:rPr lang="en-US" dirty="0"/>
+              <a:t> a </a:t>
+            </a:r>
+            <a:r>
+              <a:rPr lang="en-US" dirty="0" err="1"/>
+              <a:t>fénnyel</a:t>
+            </a:r>
+            <a:r>
+              <a:rPr lang="en-US" dirty="0"/>
+              <a:t>. </a:t>
+            </a:r>
+            <a:r>
+              <a:rPr lang="en-US" dirty="0" err="1"/>
+              <a:t>Csak</a:t>
+            </a:r>
+            <a:r>
+              <a:rPr lang="en-US" dirty="0"/>
+              <a:t> </a:t>
+            </a:r>
+            <a:r>
+              <a:rPr lang="en-US" dirty="0" err="1"/>
+              <a:t>azokat</a:t>
+            </a:r>
+            <a:r>
+              <a:rPr lang="en-US" dirty="0"/>
+              <a:t> a </a:t>
+            </a:r>
+            <a:r>
+              <a:rPr lang="en-US" dirty="0" err="1"/>
+              <a:t>fragmenteket</a:t>
+            </a:r>
+            <a:r>
+              <a:rPr lang="en-US" dirty="0"/>
+              <a:t> </a:t>
+            </a:r>
+            <a:r>
+              <a:rPr lang="en-US" dirty="0" err="1"/>
+              <a:t>engedd</a:t>
+            </a:r>
+            <a:r>
+              <a:rPr lang="en-US" dirty="0"/>
+              <a:t> </a:t>
+            </a:r>
+            <a:r>
+              <a:rPr lang="en-US" dirty="0" err="1"/>
+              <a:t>át</a:t>
+            </a:r>
+            <a:r>
+              <a:rPr lang="en-US" dirty="0"/>
+              <a:t>, </a:t>
+            </a:r>
+            <a:r>
+              <a:rPr lang="en-US" dirty="0" err="1"/>
+              <a:t>ahol</a:t>
+            </a:r>
+            <a:r>
+              <a:rPr lang="en-US" dirty="0"/>
+              <a:t> a </a:t>
+            </a:r>
+            <a:r>
+              <a:rPr lang="en-US" i="1" dirty="0"/>
+              <a:t>stencil</a:t>
+            </a:r>
+            <a:r>
+              <a:rPr lang="en-US" dirty="0"/>
+              <a:t> </a:t>
+            </a:r>
+            <a:r>
+              <a:rPr lang="en-US" dirty="0" err="1"/>
+              <a:t>nulla</a:t>
+            </a:r>
+            <a:endParaRPr lang="en-US" dirty="0"/>
+          </a:p>
+          <a:p>
+            <a:pPr>
+              <a:buFont typeface="Wingdings" panose="05000000000000000000" pitchFamily="2" charset="2"/>
+              <a:buChar char="§"/>
+            </a:pPr>
+            <a:r>
+              <a:rPr lang="en-US" i="1" dirty="0"/>
+              <a:t>(</a:t>
+            </a:r>
+            <a:r>
+              <a:rPr lang="en-US" i="1" dirty="0" err="1"/>
+              <a:t>megj</a:t>
+            </a:r>
+            <a:r>
+              <a:rPr lang="en-US" i="1" dirty="0"/>
+              <a:t>.: </a:t>
+            </a:r>
+            <a:r>
+              <a:rPr lang="en-US" i="1" dirty="0" err="1"/>
               <a:t>természetesen</a:t>
             </a:r>
             <a:r>
-              <a:rPr lang="en-US" dirty="0"/>
-              <a:t> </a:t>
-            </a:r>
-            <a:r>
               <a:rPr lang="en-US" i="1" dirty="0"/>
-              <a:t>additive blending</a:t>
-            </a:r>
-            <a:r>
-              <a:rPr lang="en-US" dirty="0"/>
-              <a:t>-gel (a </a:t>
-            </a:r>
-            <a:r>
-              <a:rPr lang="en-US" dirty="0" err="1"/>
-              <a:t>feladatban</a:t>
-            </a:r>
-            <a:r>
-              <a:rPr lang="en-US" dirty="0"/>
-              <a:t> </a:t>
-            </a:r>
-            <a:r>
-              <a:rPr lang="en-US" dirty="0" err="1"/>
-              <a:t>két</a:t>
-            </a:r>
-            <a:r>
-              <a:rPr lang="en-US" dirty="0"/>
-              <a:t> </a:t>
-            </a:r>
-            <a:r>
-              <a:rPr lang="en-US" dirty="0" err="1"/>
-              <a:t>fényforrás</a:t>
-            </a:r>
-            <a:r>
-              <a:rPr lang="en-US" dirty="0"/>
-              <a:t> van!)</a:t>
+              <a:t> additive blending-gel)</a:t>
             </a:r>
           </a:p>
           <a:p>

</xml_diff>